<commit_message>
Refactoring du dossier de methodes approchees
</commit_message>
<xml_diff>
--- a/fmin212/Presentation/presAlgoDist.pptx
+++ b/fmin212/Presentation/presAlgoDist.pptx
@@ -5,10 +5,10 @@
     <p:sldMasterId id="2147483972" r:id="rId1"/>
   </p:sldMasterIdLst>
   <p:notesMasterIdLst>
-    <p:notesMasterId r:id="rId38"/>
+    <p:notesMasterId r:id="rId41"/>
   </p:notesMasterIdLst>
   <p:handoutMasterIdLst>
-    <p:handoutMasterId r:id="rId39"/>
+    <p:handoutMasterId r:id="rId42"/>
   </p:handoutMasterIdLst>
   <p:sldIdLst>
     <p:sldId id="256" r:id="rId2"/>
@@ -43,10 +43,13 @@
     <p:sldId id="286" r:id="rId31"/>
     <p:sldId id="287" r:id="rId32"/>
     <p:sldId id="288" r:id="rId33"/>
-    <p:sldId id="289" r:id="rId34"/>
-    <p:sldId id="290" r:id="rId35"/>
-    <p:sldId id="291" r:id="rId36"/>
-    <p:sldId id="292" r:id="rId37"/>
+    <p:sldId id="293" r:id="rId34"/>
+    <p:sldId id="294" r:id="rId35"/>
+    <p:sldId id="295" r:id="rId36"/>
+    <p:sldId id="289" r:id="rId37"/>
+    <p:sldId id="290" r:id="rId38"/>
+    <p:sldId id="291" r:id="rId39"/>
+    <p:sldId id="292" r:id="rId40"/>
   </p:sldIdLst>
   <p:sldSz cx="9144000" cy="6858000" type="screen4x3"/>
   <p:notesSz cx="6858000" cy="9144000"/>
@@ -198,6 +201,9 @@
             <p14:sldId id="286"/>
             <p14:sldId id="287"/>
             <p14:sldId id="288"/>
+            <p14:sldId id="293"/>
+            <p14:sldId id="294"/>
+            <p14:sldId id="295"/>
             <p14:sldId id="289"/>
           </p14:sldIdLst>
         </p14:section>
@@ -299,7 +305,7 @@
           </a:lstStyle>
           <a:p>
             <a:fld id="{4D546538-2C7B-BB4B-A09E-AD14A378EDC3}" type="datetimeFigureOut">
-              <a:t>09/05/12</a:t>
+              <a:t>10/05/12</a:t>
             </a:fld>
             <a:endParaRPr lang="fr-FR"/>
           </a:p>
@@ -463,7 +469,7 @@
           </a:lstStyle>
           <a:p>
             <a:fld id="{78DCF9BA-9780-BB40-AC66-CC6CBBF9F9B1}" type="datetimeFigureOut">
-              <a:t>09/05/12</a:t>
+              <a:t>10/05/12</a:t>
             </a:fld>
             <a:endParaRPr lang="fr-FR"/>
           </a:p>
@@ -977,7 +983,7 @@
           </a:lstStyle>
           <a:p>
             <a:fld id="{43BFB192-3AA8-A142-B937-C7453E63B6D2}" type="datetime1">
-              <a:t>09/05/12</a:t>
+              <a:t>10/05/12</a:t>
             </a:fld>
             <a:endParaRPr lang="en-US"/>
           </a:p>
@@ -1151,7 +1157,7 @@
           </a:lstStyle>
           <a:p>
             <a:fld id="{E1A30BE2-04E1-7F4D-9F9D-DC2F235B41F8}" type="datetime1">
-              <a:t>09/05/12</a:t>
+              <a:t>10/05/12</a:t>
             </a:fld>
             <a:endParaRPr lang="en-US"/>
           </a:p>
@@ -1336,7 +1342,7 @@
           </a:lstStyle>
           <a:p>
             <a:fld id="{C1B89227-6ECC-4E4E-B9AD-1FFBA635C940}" type="datetime1">
-              <a:t>09/05/12</a:t>
+              <a:t>10/05/12</a:t>
             </a:fld>
             <a:endParaRPr lang="en-US"/>
           </a:p>
@@ -1511,7 +1517,7 @@
           </a:lstStyle>
           <a:p>
             <a:fld id="{DA9073F2-4D27-2E44-A5FD-3208A634C97C}" type="datetime1">
-              <a:t>09/05/12</a:t>
+              <a:t>10/05/12</a:t>
             </a:fld>
             <a:endParaRPr lang="en-US"/>
           </a:p>
@@ -1779,7 +1785,7 @@
           </a:lstStyle>
           <a:p>
             <a:fld id="{27D4917F-DC61-EB45-9F91-D4CACD2B0132}" type="datetime1">
-              <a:t>09/05/12</a:t>
+              <a:t>10/05/12</a:t>
             </a:fld>
             <a:endParaRPr lang="en-US"/>
           </a:p>
@@ -2109,7 +2115,7 @@
           </a:lstStyle>
           <a:p>
             <a:fld id="{3B036F9E-2EA2-7B48-B040-9B4A6BEC508B}" type="datetime1">
-              <a:t>09/05/12</a:t>
+              <a:t>10/05/12</a:t>
             </a:fld>
             <a:endParaRPr lang="en-US"/>
           </a:p>
@@ -2598,7 +2604,7 @@
           </a:lstStyle>
           <a:p>
             <a:fld id="{11D24C3F-CD4B-6D44-9F57-EC1EE551585D}" type="datetime1">
-              <a:t>09/05/12</a:t>
+              <a:t>10/05/12</a:t>
             </a:fld>
             <a:endParaRPr lang="en-US"/>
           </a:p>
@@ -2724,7 +2730,7 @@
           </a:lstStyle>
           <a:p>
             <a:fld id="{2D85652D-D1A5-DA4A-AEC8-B295E1EFD854}" type="datetime1">
-              <a:t>09/05/12</a:t>
+              <a:t>10/05/12</a:t>
             </a:fld>
             <a:endParaRPr lang="en-US"/>
           </a:p>
@@ -2868,7 +2874,7 @@
           </a:lstStyle>
           <a:p>
             <a:fld id="{DF436193-BA25-8D45-B808-BCAB48FD56AB}" type="datetime1">
-              <a:t>09/05/12</a:t>
+              <a:t>10/05/12</a:t>
             </a:fld>
             <a:endParaRPr lang="en-US"/>
           </a:p>
@@ -3190,7 +3196,7 @@
           </a:lstStyle>
           <a:p>
             <a:fld id="{B5DB041D-F10A-954D-A19C-4EE11D52B471}" type="datetime1">
-              <a:t>09/05/12</a:t>
+              <a:t>10/05/12</a:t>
             </a:fld>
             <a:endParaRPr lang="en-US"/>
           </a:p>
@@ -3324,7 +3330,7 @@
           </a:lstStyle>
           <a:p>
             <a:fld id="{A164D489-C3B5-E14D-A048-54216BB70BB8}" type="datetime1">
-              <a:t>09/05/12</a:t>
+              <a:t>10/05/12</a:t>
             </a:fld>
             <a:endParaRPr lang="en-US"/>
           </a:p>
@@ -4107,7 +4113,7 @@
             <a:fld id="{AE040967-DBA9-D048-AAD3-DC22DCC01C4A}" type="datetime1">
               <a:rPr lang="fr-FR" smtClean="0"/>
               <a:pPr/>
-              <a:t>09/05/12</a:t>
+              <a:t>10/05/12</a:t>
             </a:fld>
             <a:endParaRPr lang="en-US" dirty="0"/>
           </a:p>
@@ -4685,15 +4691,7 @@
                   <a:schemeClr val="bg2"/>
                 </a:solidFill>
               </a:rPr>
-              <a:t>Chloé Desdouits 	</a:t>
-            </a:r>
-            <a:r>
-              <a:rPr lang="fr-FR">
-                <a:solidFill>
-                  <a:schemeClr val="bg2"/>
-                </a:solidFill>
-              </a:rPr>
-              <a:t>Guillerme Duvillié 	Swan Rocher</a:t>
+              <a:t>Chloé Desdouits 	Guillerme Duvillié 	Swan Rocher</a:t>
             </a:r>
           </a:p>
         </p:txBody>
@@ -4796,9 +4794,16 @@
             <p:ph idx="1"/>
           </p:nvPr>
         </p:nvSpPr>
-        <p:spPr/>
-        <p:txBody>
-          <a:bodyPr/>
+        <p:spPr>
+          <a:xfrm>
+            <a:off x="1435608" y="1447800"/>
+            <a:ext cx="7498080" cy="5334000"/>
+          </a:xfrm>
+        </p:spPr>
+        <p:txBody>
+          <a:bodyPr>
+            <a:normAutofit/>
+          </a:bodyPr>
           <a:lstStyle/>
           <a:p>
             <a:r>
@@ -4809,6 +4814,34 @@
               <a:rPr lang="fr-FR"/>
               <a:t> fait une demande de section critique</a:t>
             </a:r>
+          </a:p>
+          <a:p>
+            <a:endParaRPr lang="fr-FR"/>
+          </a:p>
+          <a:p>
+            <a:endParaRPr lang="fr-FR"/>
+          </a:p>
+          <a:p>
+            <a:endParaRPr lang="fr-FR"/>
+          </a:p>
+          <a:p>
+            <a:endParaRPr lang="fr-FR"/>
+          </a:p>
+          <a:p>
+            <a:endParaRPr lang="fr-FR"/>
+          </a:p>
+          <a:p>
+            <a:r>
+              <a:rPr lang="fr-FR" i="1"/>
+              <a:t>c</a:t>
+            </a:r>
+            <a:r>
+              <a:rPr lang="fr-FR"/>
+              <a:t> fait une demande de section critique</a:t>
+            </a:r>
+          </a:p>
+          <a:p>
+            <a:endParaRPr lang="fr-FR"/>
           </a:p>
         </p:txBody>
       </p:sp>
@@ -4844,7 +4877,7 @@
         </p:nvSpPr>
         <p:spPr>
           <a:xfrm>
-            <a:off x="1407010" y="4001743"/>
+            <a:off x="1262994" y="3641703"/>
             <a:ext cx="339941" cy="342968"/>
           </a:xfrm>
           <a:prstGeom prst="ellipse">
@@ -4887,7 +4920,7 @@
         </p:nvSpPr>
         <p:spPr>
           <a:xfrm>
-            <a:off x="2647122" y="3385453"/>
+            <a:off x="2503106" y="3025413"/>
             <a:ext cx="339941" cy="342968"/>
           </a:xfrm>
           <a:prstGeom prst="ellipse">
@@ -4930,7 +4963,7 @@
         </p:nvSpPr>
         <p:spPr>
           <a:xfrm>
-            <a:off x="424098" y="3658775"/>
+            <a:off x="280082" y="3298735"/>
             <a:ext cx="339941" cy="342968"/>
           </a:xfrm>
           <a:prstGeom prst="ellipse">
@@ -4973,7 +5006,7 @@
         </p:nvSpPr>
         <p:spPr>
           <a:xfrm>
-            <a:off x="2083001" y="5533647"/>
+            <a:off x="1938985" y="5173607"/>
             <a:ext cx="339941" cy="342968"/>
           </a:xfrm>
           <a:prstGeom prst="ellipse">
@@ -5016,7 +5049,7 @@
         </p:nvSpPr>
         <p:spPr>
           <a:xfrm>
-            <a:off x="1913030" y="4540257"/>
+            <a:off x="1769014" y="4180217"/>
             <a:ext cx="339941" cy="342968"/>
           </a:xfrm>
           <a:prstGeom prst="ellipse">
@@ -5062,7 +5095,7 @@
         </p:nvCxnSpPr>
         <p:spPr>
           <a:xfrm>
-            <a:off x="764039" y="3830259"/>
+            <a:off x="620023" y="3470219"/>
             <a:ext cx="692754" cy="221711"/>
           </a:xfrm>
           <a:prstGeom prst="line">
@@ -5095,7 +5128,7 @@
         </p:nvCxnSpPr>
         <p:spPr>
           <a:xfrm flipV="1">
-            <a:off x="1697168" y="3556937"/>
+            <a:off x="1553152" y="3196897"/>
             <a:ext cx="949954" cy="495033"/>
           </a:xfrm>
           <a:prstGeom prst="line">
@@ -5128,7 +5161,7 @@
         </p:nvCxnSpPr>
         <p:spPr>
           <a:xfrm flipH="1">
-            <a:off x="2203188" y="3678194"/>
+            <a:off x="2059172" y="3318154"/>
             <a:ext cx="493717" cy="912290"/>
           </a:xfrm>
           <a:prstGeom prst="line">
@@ -5161,7 +5194,7 @@
         </p:nvCxnSpPr>
         <p:spPr>
           <a:xfrm>
-            <a:off x="2083001" y="4883225"/>
+            <a:off x="1938985" y="4523185"/>
             <a:ext cx="169971" cy="650422"/>
           </a:xfrm>
           <a:prstGeom prst="line">
@@ -5194,7 +5227,7 @@
         </p:nvCxnSpPr>
         <p:spPr>
           <a:xfrm flipH="1" flipV="1">
-            <a:off x="594069" y="4001743"/>
+            <a:off x="450053" y="3641703"/>
             <a:ext cx="1488932" cy="1703388"/>
           </a:xfrm>
           <a:prstGeom prst="line">
@@ -5227,7 +5260,7 @@
         </p:nvCxnSpPr>
         <p:spPr>
           <a:xfrm>
-            <a:off x="1576981" y="4344711"/>
+            <a:off x="1432965" y="3984671"/>
             <a:ext cx="555803" cy="1239163"/>
           </a:xfrm>
           <a:prstGeom prst="line">
@@ -5260,7 +5293,7 @@
         </p:nvCxnSpPr>
         <p:spPr>
           <a:xfrm>
-            <a:off x="1697168" y="4294484"/>
+            <a:off x="1553152" y="3934444"/>
             <a:ext cx="265645" cy="296000"/>
           </a:xfrm>
           <a:prstGeom prst="line">
@@ -5293,7 +5326,7 @@
         </p:nvCxnSpPr>
         <p:spPr>
           <a:xfrm flipV="1">
-            <a:off x="714256" y="3435680"/>
+            <a:off x="570240" y="3075640"/>
             <a:ext cx="1982649" cy="273322"/>
           </a:xfrm>
           <a:prstGeom prst="line">
@@ -5326,7 +5359,7 @@
         </p:nvCxnSpPr>
         <p:spPr>
           <a:xfrm>
-            <a:off x="714256" y="3951516"/>
+            <a:off x="570240" y="3591476"/>
             <a:ext cx="1198774" cy="760225"/>
           </a:xfrm>
           <a:prstGeom prst="line">
@@ -5359,7 +5392,7 @@
         </p:nvCxnSpPr>
         <p:spPr>
           <a:xfrm flipH="1">
-            <a:off x="2373159" y="3728421"/>
+            <a:off x="2229143" y="3368381"/>
             <a:ext cx="443934" cy="1855453"/>
           </a:xfrm>
           <a:prstGeom prst="line">
@@ -5389,7 +5422,7 @@
         </p:nvSpPr>
         <p:spPr>
           <a:xfrm>
-            <a:off x="4408642" y="4057336"/>
+            <a:off x="4264626" y="3697296"/>
             <a:ext cx="339941" cy="342968"/>
           </a:xfrm>
           <a:prstGeom prst="ellipse">
@@ -5432,7 +5465,7 @@
         </p:nvSpPr>
         <p:spPr>
           <a:xfrm>
-            <a:off x="5648754" y="3441046"/>
+            <a:off x="5504738" y="3081006"/>
             <a:ext cx="339941" cy="342968"/>
           </a:xfrm>
           <a:prstGeom prst="ellipse">
@@ -5475,7 +5508,7 @@
         </p:nvSpPr>
         <p:spPr>
           <a:xfrm>
-            <a:off x="3425730" y="3714368"/>
+            <a:off x="3281714" y="3354328"/>
             <a:ext cx="339941" cy="342968"/>
           </a:xfrm>
           <a:prstGeom prst="ellipse">
@@ -5518,7 +5551,7 @@
         </p:nvSpPr>
         <p:spPr>
           <a:xfrm>
-            <a:off x="5084633" y="5589240"/>
+            <a:off x="4940617" y="5229200"/>
             <a:ext cx="339941" cy="342968"/>
           </a:xfrm>
           <a:prstGeom prst="ellipse">
@@ -5561,7 +5594,7 @@
         </p:nvSpPr>
         <p:spPr>
           <a:xfrm>
-            <a:off x="4914662" y="4595850"/>
+            <a:off x="4770646" y="4235810"/>
             <a:ext cx="339941" cy="342968"/>
           </a:xfrm>
           <a:prstGeom prst="ellipse">
@@ -5607,7 +5640,7 @@
         </p:nvCxnSpPr>
         <p:spPr>
           <a:xfrm>
-            <a:off x="3765671" y="3885852"/>
+            <a:off x="3621655" y="3525812"/>
             <a:ext cx="692754" cy="221711"/>
           </a:xfrm>
           <a:prstGeom prst="line">
@@ -5644,7 +5677,7 @@
         </p:nvCxnSpPr>
         <p:spPr>
           <a:xfrm flipV="1">
-            <a:off x="4698800" y="3612530"/>
+            <a:off x="4554784" y="3252490"/>
             <a:ext cx="949954" cy="495033"/>
           </a:xfrm>
           <a:prstGeom prst="line">
@@ -5681,7 +5714,7 @@
         </p:nvCxnSpPr>
         <p:spPr>
           <a:xfrm>
-            <a:off x="4578613" y="4400304"/>
+            <a:off x="4434597" y="4040264"/>
             <a:ext cx="555803" cy="1239163"/>
           </a:xfrm>
           <a:prstGeom prst="line">
@@ -5718,7 +5751,7 @@
         </p:nvCxnSpPr>
         <p:spPr>
           <a:xfrm>
-            <a:off x="4698800" y="4350077"/>
+            <a:off x="4554784" y="3990037"/>
             <a:ext cx="265645" cy="296000"/>
           </a:xfrm>
           <a:prstGeom prst="line">
@@ -5752,7 +5785,7 @@
         </p:nvSpPr>
         <p:spPr>
           <a:xfrm>
-            <a:off x="7352393" y="4057336"/>
+            <a:off x="7208377" y="3697296"/>
             <a:ext cx="339941" cy="342968"/>
           </a:xfrm>
           <a:prstGeom prst="ellipse">
@@ -5795,7 +5828,7 @@
         </p:nvSpPr>
         <p:spPr>
           <a:xfrm>
-            <a:off x="8592505" y="3441046"/>
+            <a:off x="8448489" y="3081006"/>
             <a:ext cx="339941" cy="342968"/>
           </a:xfrm>
           <a:prstGeom prst="ellipse">
@@ -5838,7 +5871,7 @@
         </p:nvSpPr>
         <p:spPr>
           <a:xfrm>
-            <a:off x="6369481" y="3714368"/>
+            <a:off x="6225465" y="3354328"/>
             <a:ext cx="339941" cy="342968"/>
           </a:xfrm>
           <a:prstGeom prst="ellipse">
@@ -5881,7 +5914,7 @@
         </p:nvSpPr>
         <p:spPr>
           <a:xfrm>
-            <a:off x="8028384" y="5589240"/>
+            <a:off x="7884368" y="5229200"/>
             <a:ext cx="339941" cy="342968"/>
           </a:xfrm>
           <a:prstGeom prst="ellipse">
@@ -5924,7 +5957,7 @@
         </p:nvSpPr>
         <p:spPr>
           <a:xfrm>
-            <a:off x="7858413" y="4595850"/>
+            <a:off x="7714397" y="4235810"/>
             <a:ext cx="339941" cy="342968"/>
           </a:xfrm>
           <a:prstGeom prst="ellipse">
@@ -5969,6 +6002,88 @@
   <p:clrMapOvr>
     <a:masterClrMapping/>
   </p:clrMapOvr>
+  <p:timing>
+    <p:tnLst>
+      <p:par>
+        <p:cTn xmlns:p14="http://schemas.microsoft.com/office/powerpoint/2010/main" id="1" dur="indefinite" restart="never" nodeType="tmRoot">
+          <p:childTnLst>
+            <p:seq concurrent="1" nextAc="seek">
+              <p:cTn id="2" dur="indefinite" nodeType="mainSeq">
+                <p:childTnLst>
+                  <p:par>
+                    <p:cTn id="3" fill="hold">
+                      <p:stCondLst>
+                        <p:cond delay="indefinite"/>
+                      </p:stCondLst>
+                      <p:childTnLst>
+                        <p:par>
+                          <p:cTn id="4" fill="hold">
+                            <p:stCondLst>
+                              <p:cond delay="0"/>
+                            </p:stCondLst>
+                            <p:childTnLst>
+                              <p:par>
+                                <p:cTn id="5" presetID="1" presetClass="entr" presetSubtype="0" fill="hold" grpId="0" nodeType="clickEffect">
+                                  <p:stCondLst>
+                                    <p:cond delay="0"/>
+                                  </p:stCondLst>
+                                  <p:childTnLst>
+                                    <p:set>
+                                      <p:cBhvr>
+                                        <p:cTn id="6" dur="1" fill="hold">
+                                          <p:stCondLst>
+                                            <p:cond delay="0"/>
+                                          </p:stCondLst>
+                                        </p:cTn>
+                                        <p:tgtEl>
+                                          <p:spTgt spid="4">
+                                            <p:txEl>
+                                              <p:pRg st="6" end="6"/>
+                                            </p:txEl>
+                                          </p:spTgt>
+                                        </p:tgtEl>
+                                        <p:attrNameLst>
+                                          <p:attrName>style.visibility</p:attrName>
+                                        </p:attrNameLst>
+                                      </p:cBhvr>
+                                      <p:to>
+                                        <p:strVal val="visible"/>
+                                      </p:to>
+                                    </p:set>
+                                  </p:childTnLst>
+                                </p:cTn>
+                              </p:par>
+                            </p:childTnLst>
+                          </p:cTn>
+                        </p:par>
+                      </p:childTnLst>
+                    </p:cTn>
+                  </p:par>
+                </p:childTnLst>
+              </p:cTn>
+              <p:prevCondLst>
+                <p:cond evt="onPrev" delay="0">
+                  <p:tgtEl>
+                    <p:sldTgt/>
+                  </p:tgtEl>
+                </p:cond>
+              </p:prevCondLst>
+              <p:nextCondLst>
+                <p:cond evt="onNext" delay="0">
+                  <p:tgtEl>
+                    <p:sldTgt/>
+                  </p:tgtEl>
+                </p:cond>
+              </p:nextCondLst>
+            </p:seq>
+          </p:childTnLst>
+        </p:cTn>
+      </p:par>
+    </p:tnLst>
+    <p:bldLst>
+      <p:bldP spid="4" grpId="0" uiExpand="1" build="p"/>
+    </p:bldLst>
+  </p:timing>
 </p:sld>
 </file>
 
@@ -6021,9 +6136,16 @@
             <p:ph idx="1"/>
           </p:nvPr>
         </p:nvSpPr>
-        <p:spPr/>
-        <p:txBody>
-          <a:bodyPr/>
+        <p:spPr>
+          <a:xfrm>
+            <a:off x="1435608" y="1447800"/>
+            <a:ext cx="7498080" cy="5334000"/>
+          </a:xfrm>
+        </p:spPr>
+        <p:txBody>
+          <a:bodyPr>
+            <a:normAutofit/>
+          </a:bodyPr>
           <a:lstStyle/>
           <a:p>
             <a:r>
@@ -6034,6 +6156,34 @@
               <a:rPr lang="fr-FR"/>
               <a:t> fait une demande de section critique</a:t>
             </a:r>
+          </a:p>
+          <a:p>
+            <a:endParaRPr lang="fr-FR"/>
+          </a:p>
+          <a:p>
+            <a:endParaRPr lang="fr-FR"/>
+          </a:p>
+          <a:p>
+            <a:endParaRPr lang="fr-FR"/>
+          </a:p>
+          <a:p>
+            <a:endParaRPr lang="fr-FR"/>
+          </a:p>
+          <a:p>
+            <a:endParaRPr lang="fr-FR"/>
+          </a:p>
+          <a:p>
+            <a:r>
+              <a:rPr lang="fr-FR" i="1"/>
+              <a:t>d</a:t>
+            </a:r>
+            <a:r>
+              <a:rPr lang="fr-FR"/>
+              <a:t> fait une demande de section critique</a:t>
+            </a:r>
+          </a:p>
+          <a:p>
+            <a:endParaRPr lang="fr-FR"/>
           </a:p>
         </p:txBody>
       </p:sp>
@@ -6069,7 +6219,7 @@
         </p:nvSpPr>
         <p:spPr>
           <a:xfrm>
-            <a:off x="1403421" y="4024711"/>
+            <a:off x="1262994" y="3641703"/>
             <a:ext cx="339941" cy="342968"/>
           </a:xfrm>
           <a:prstGeom prst="ellipse">
@@ -6112,7 +6262,7 @@
         </p:nvSpPr>
         <p:spPr>
           <a:xfrm>
-            <a:off x="2643533" y="3408421"/>
+            <a:off x="2503106" y="3025413"/>
             <a:ext cx="339941" cy="342968"/>
           </a:xfrm>
           <a:prstGeom prst="ellipse">
@@ -6155,7 +6305,7 @@
         </p:nvSpPr>
         <p:spPr>
           <a:xfrm>
-            <a:off x="420509" y="3681743"/>
+            <a:off x="280082" y="3298735"/>
             <a:ext cx="339941" cy="342968"/>
           </a:xfrm>
           <a:prstGeom prst="ellipse">
@@ -6198,7 +6348,7 @@
         </p:nvSpPr>
         <p:spPr>
           <a:xfrm>
-            <a:off x="2079412" y="5556615"/>
+            <a:off x="1938985" y="5173607"/>
             <a:ext cx="339941" cy="342968"/>
           </a:xfrm>
           <a:prstGeom prst="ellipse">
@@ -6241,7 +6391,7 @@
         </p:nvSpPr>
         <p:spPr>
           <a:xfrm>
-            <a:off x="1909441" y="4563225"/>
+            <a:off x="1769014" y="4180217"/>
             <a:ext cx="339941" cy="342968"/>
           </a:xfrm>
           <a:prstGeom prst="ellipse">
@@ -6287,7 +6437,7 @@
         </p:nvCxnSpPr>
         <p:spPr>
           <a:xfrm>
-            <a:off x="760450" y="3853227"/>
+            <a:off x="620023" y="3470219"/>
             <a:ext cx="692754" cy="221711"/>
           </a:xfrm>
           <a:prstGeom prst="line">
@@ -6320,7 +6470,7 @@
         </p:nvCxnSpPr>
         <p:spPr>
           <a:xfrm flipV="1">
-            <a:off x="1693579" y="3579905"/>
+            <a:off x="1553152" y="3196897"/>
             <a:ext cx="949954" cy="495033"/>
           </a:xfrm>
           <a:prstGeom prst="line">
@@ -6353,7 +6503,7 @@
         </p:nvCxnSpPr>
         <p:spPr>
           <a:xfrm flipH="1">
-            <a:off x="2199599" y="3701162"/>
+            <a:off x="2059172" y="3318154"/>
             <a:ext cx="493717" cy="912290"/>
           </a:xfrm>
           <a:prstGeom prst="line">
@@ -6386,7 +6536,7 @@
         </p:nvCxnSpPr>
         <p:spPr>
           <a:xfrm>
-            <a:off x="2079412" y="4906193"/>
+            <a:off x="1938985" y="4523185"/>
             <a:ext cx="169971" cy="650422"/>
           </a:xfrm>
           <a:prstGeom prst="line">
@@ -6419,7 +6569,7 @@
         </p:nvCxnSpPr>
         <p:spPr>
           <a:xfrm flipH="1" flipV="1">
-            <a:off x="590480" y="4024711"/>
+            <a:off x="450053" y="3641703"/>
             <a:ext cx="1488932" cy="1703388"/>
           </a:xfrm>
           <a:prstGeom prst="line">
@@ -6452,7 +6602,7 @@
         </p:nvCxnSpPr>
         <p:spPr>
           <a:xfrm>
-            <a:off x="1573392" y="4367679"/>
+            <a:off x="1432965" y="3984671"/>
             <a:ext cx="555803" cy="1239163"/>
           </a:xfrm>
           <a:prstGeom prst="line">
@@ -6485,7 +6635,7 @@
         </p:nvCxnSpPr>
         <p:spPr>
           <a:xfrm>
-            <a:off x="1693579" y="4317452"/>
+            <a:off x="1553152" y="3934444"/>
             <a:ext cx="265645" cy="296000"/>
           </a:xfrm>
           <a:prstGeom prst="line">
@@ -6518,7 +6668,7 @@
         </p:nvCxnSpPr>
         <p:spPr>
           <a:xfrm flipV="1">
-            <a:off x="710667" y="3458648"/>
+            <a:off x="570240" y="3075640"/>
             <a:ext cx="1982649" cy="273322"/>
           </a:xfrm>
           <a:prstGeom prst="line">
@@ -6551,7 +6701,7 @@
         </p:nvCxnSpPr>
         <p:spPr>
           <a:xfrm>
-            <a:off x="710667" y="3974484"/>
+            <a:off x="570240" y="3591476"/>
             <a:ext cx="1198774" cy="760225"/>
           </a:xfrm>
           <a:prstGeom prst="line">
@@ -6584,7 +6734,7 @@
         </p:nvCxnSpPr>
         <p:spPr>
           <a:xfrm flipH="1">
-            <a:off x="2369570" y="3751389"/>
+            <a:off x="2229143" y="3368381"/>
             <a:ext cx="443934" cy="1855453"/>
           </a:xfrm>
           <a:prstGeom prst="line">
@@ -6614,7 +6764,7 @@
         </p:nvSpPr>
         <p:spPr>
           <a:xfrm>
-            <a:off x="4405053" y="4080304"/>
+            <a:off x="4264626" y="3697296"/>
             <a:ext cx="339941" cy="342968"/>
           </a:xfrm>
           <a:prstGeom prst="ellipse">
@@ -6657,7 +6807,7 @@
         </p:nvSpPr>
         <p:spPr>
           <a:xfrm>
-            <a:off x="5645165" y="3464014"/>
+            <a:off x="5504738" y="3081006"/>
             <a:ext cx="339941" cy="342968"/>
           </a:xfrm>
           <a:prstGeom prst="ellipse">
@@ -6700,7 +6850,7 @@
         </p:nvSpPr>
         <p:spPr>
           <a:xfrm>
-            <a:off x="3422141" y="3737336"/>
+            <a:off x="3281714" y="3354328"/>
             <a:ext cx="339941" cy="342968"/>
           </a:xfrm>
           <a:prstGeom prst="ellipse">
@@ -6743,7 +6893,7 @@
         </p:nvSpPr>
         <p:spPr>
           <a:xfrm>
-            <a:off x="5081044" y="5612208"/>
+            <a:off x="4940617" y="5229200"/>
             <a:ext cx="339941" cy="342968"/>
           </a:xfrm>
           <a:prstGeom prst="ellipse">
@@ -6786,7 +6936,7 @@
         </p:nvSpPr>
         <p:spPr>
           <a:xfrm>
-            <a:off x="4911073" y="4618818"/>
+            <a:off x="4770646" y="4235810"/>
             <a:ext cx="339941" cy="342968"/>
           </a:xfrm>
           <a:prstGeom prst="ellipse">
@@ -6832,7 +6982,7 @@
         </p:nvCxnSpPr>
         <p:spPr>
           <a:xfrm flipH="1">
-            <a:off x="3762082" y="3635498"/>
+            <a:off x="3621655" y="3252490"/>
             <a:ext cx="1883083" cy="273322"/>
           </a:xfrm>
           <a:prstGeom prst="line">
@@ -6869,7 +7019,7 @@
         </p:nvCxnSpPr>
         <p:spPr>
           <a:xfrm flipV="1">
-            <a:off x="4695211" y="3756755"/>
+            <a:off x="4554784" y="3373747"/>
             <a:ext cx="999737" cy="373776"/>
           </a:xfrm>
           <a:prstGeom prst="line">
@@ -6906,7 +7056,7 @@
         </p:nvCxnSpPr>
         <p:spPr>
           <a:xfrm>
-            <a:off x="4575024" y="4423272"/>
+            <a:off x="4434597" y="4040264"/>
             <a:ext cx="555803" cy="1239163"/>
           </a:xfrm>
           <a:prstGeom prst="line">
@@ -6943,7 +7093,7 @@
         </p:nvCxnSpPr>
         <p:spPr>
           <a:xfrm>
-            <a:off x="4695211" y="4373045"/>
+            <a:off x="4554784" y="3990037"/>
             <a:ext cx="265645" cy="296000"/>
           </a:xfrm>
           <a:prstGeom prst="line">
@@ -6977,7 +7127,7 @@
         </p:nvSpPr>
         <p:spPr>
           <a:xfrm>
-            <a:off x="7348804" y="4080304"/>
+            <a:off x="7208377" y="3697296"/>
             <a:ext cx="339941" cy="342968"/>
           </a:xfrm>
           <a:prstGeom prst="ellipse">
@@ -7020,7 +7170,7 @@
         </p:nvSpPr>
         <p:spPr>
           <a:xfrm>
-            <a:off x="8588916" y="3464014"/>
+            <a:off x="8448489" y="3081006"/>
             <a:ext cx="339941" cy="342968"/>
           </a:xfrm>
           <a:prstGeom prst="ellipse">
@@ -7063,7 +7213,7 @@
         </p:nvSpPr>
         <p:spPr>
           <a:xfrm>
-            <a:off x="6365892" y="3737336"/>
+            <a:off x="6225465" y="3354328"/>
             <a:ext cx="339941" cy="342968"/>
           </a:xfrm>
           <a:prstGeom prst="ellipse">
@@ -7106,7 +7256,7 @@
         </p:nvSpPr>
         <p:spPr>
           <a:xfrm>
-            <a:off x="8024795" y="5612208"/>
+            <a:off x="7884368" y="5229200"/>
             <a:ext cx="339941" cy="342968"/>
           </a:xfrm>
           <a:prstGeom prst="ellipse">
@@ -7149,7 +7299,7 @@
         </p:nvSpPr>
         <p:spPr>
           <a:xfrm>
-            <a:off x="7854824" y="4618818"/>
+            <a:off x="7714397" y="4235810"/>
             <a:ext cx="339941" cy="342968"/>
           </a:xfrm>
           <a:prstGeom prst="ellipse">
@@ -7195,7 +7345,7 @@
         </p:nvCxnSpPr>
         <p:spPr>
           <a:xfrm flipH="1">
-            <a:off x="6705833" y="3635498"/>
+            <a:off x="6565406" y="3252490"/>
             <a:ext cx="1883083" cy="273322"/>
           </a:xfrm>
           <a:prstGeom prst="line">
@@ -7231,6 +7381,85 @@
   <p:clrMapOvr>
     <a:masterClrMapping/>
   </p:clrMapOvr>
+  <p:timing>
+    <p:tnLst>
+      <p:par>
+        <p:cTn xmlns:p14="http://schemas.microsoft.com/office/powerpoint/2010/main" id="1" dur="indefinite" restart="never" nodeType="tmRoot">
+          <p:childTnLst>
+            <p:seq concurrent="1" nextAc="seek">
+              <p:cTn id="2" dur="indefinite" nodeType="mainSeq">
+                <p:childTnLst>
+                  <p:par>
+                    <p:cTn id="3" fill="hold">
+                      <p:stCondLst>
+                        <p:cond delay="indefinite"/>
+                      </p:stCondLst>
+                      <p:childTnLst>
+                        <p:par>
+                          <p:cTn id="4" fill="hold">
+                            <p:stCondLst>
+                              <p:cond delay="0"/>
+                            </p:stCondLst>
+                            <p:childTnLst>
+                              <p:par>
+                                <p:cTn id="5" presetID="1" presetClass="entr" presetSubtype="0" fill="hold" nodeType="clickEffect">
+                                  <p:stCondLst>
+                                    <p:cond delay="0"/>
+                                  </p:stCondLst>
+                                  <p:childTnLst>
+                                    <p:set>
+                                      <p:cBhvr>
+                                        <p:cTn id="6" dur="1" fill="hold">
+                                          <p:stCondLst>
+                                            <p:cond delay="0"/>
+                                          </p:stCondLst>
+                                        </p:cTn>
+                                        <p:tgtEl>
+                                          <p:spTgt spid="4">
+                                            <p:txEl>
+                                              <p:pRg st="6" end="6"/>
+                                            </p:txEl>
+                                          </p:spTgt>
+                                        </p:tgtEl>
+                                        <p:attrNameLst>
+                                          <p:attrName>style.visibility</p:attrName>
+                                        </p:attrNameLst>
+                                      </p:cBhvr>
+                                      <p:to>
+                                        <p:strVal val="visible"/>
+                                      </p:to>
+                                    </p:set>
+                                  </p:childTnLst>
+                                </p:cTn>
+                              </p:par>
+                            </p:childTnLst>
+                          </p:cTn>
+                        </p:par>
+                      </p:childTnLst>
+                    </p:cTn>
+                  </p:par>
+                </p:childTnLst>
+              </p:cTn>
+              <p:prevCondLst>
+                <p:cond evt="onPrev" delay="0">
+                  <p:tgtEl>
+                    <p:sldTgt/>
+                  </p:tgtEl>
+                </p:cond>
+              </p:prevCondLst>
+              <p:nextCondLst>
+                <p:cond evt="onNext" delay="0">
+                  <p:tgtEl>
+                    <p:sldTgt/>
+                  </p:tgtEl>
+                </p:cond>
+              </p:nextCondLst>
+            </p:seq>
+          </p:childTnLst>
+        </p:cTn>
+      </p:par>
+    </p:tnLst>
+  </p:timing>
 </p:sld>
 </file>
 
@@ -7283,9 +7512,16 @@
             <p:ph idx="1"/>
           </p:nvPr>
         </p:nvSpPr>
-        <p:spPr/>
-        <p:txBody>
-          <a:bodyPr/>
+        <p:spPr>
+          <a:xfrm>
+            <a:off x="1435608" y="1447800"/>
+            <a:ext cx="7498080" cy="5334000"/>
+          </a:xfrm>
+        </p:spPr>
+        <p:txBody>
+          <a:bodyPr>
+            <a:normAutofit/>
+          </a:bodyPr>
           <a:lstStyle/>
           <a:p>
             <a:r>
@@ -7296,6 +7532,32 @@
               <a:rPr lang="fr-FR"/>
               <a:t> fait une demande de section critique</a:t>
             </a:r>
+          </a:p>
+          <a:p>
+            <a:endParaRPr lang="fr-FR"/>
+          </a:p>
+          <a:p>
+            <a:endParaRPr lang="fr-FR"/>
+          </a:p>
+          <a:p>
+            <a:endParaRPr lang="fr-FR"/>
+          </a:p>
+          <a:p>
+            <a:endParaRPr lang="fr-FR"/>
+          </a:p>
+          <a:p>
+            <a:endParaRPr lang="fr-FR"/>
+          </a:p>
+          <a:p>
+            <a:r>
+              <a:rPr lang="fr-FR" i="1"/>
+              <a:t>b</a:t>
+            </a:r>
+            <a:r>
+              <a:rPr lang="fr-FR"/>
+              <a:t> relâche la section critique</a:t>
+            </a:r>
+            <a:endParaRPr lang="fr-FR" i="1"/>
           </a:p>
         </p:txBody>
       </p:sp>
@@ -7331,7 +7593,7 @@
         </p:nvSpPr>
         <p:spPr>
           <a:xfrm>
-            <a:off x="1380951" y="4034908"/>
+            <a:off x="1281385" y="3636347"/>
             <a:ext cx="339941" cy="342968"/>
           </a:xfrm>
           <a:prstGeom prst="ellipse">
@@ -7374,7 +7636,7 @@
         </p:nvSpPr>
         <p:spPr>
           <a:xfrm>
-            <a:off x="2621063" y="3418618"/>
+            <a:off x="2521497" y="3020057"/>
             <a:ext cx="339941" cy="342968"/>
           </a:xfrm>
           <a:prstGeom prst="ellipse">
@@ -7417,7 +7679,7 @@
         </p:nvSpPr>
         <p:spPr>
           <a:xfrm>
-            <a:off x="398039" y="3691940"/>
+            <a:off x="298473" y="3293379"/>
             <a:ext cx="339941" cy="342968"/>
           </a:xfrm>
           <a:prstGeom prst="ellipse">
@@ -7460,7 +7722,7 @@
         </p:nvSpPr>
         <p:spPr>
           <a:xfrm>
-            <a:off x="2056942" y="5566812"/>
+            <a:off x="1957376" y="5168251"/>
             <a:ext cx="339941" cy="342968"/>
           </a:xfrm>
           <a:prstGeom prst="ellipse">
@@ -7503,7 +7765,7 @@
         </p:nvSpPr>
         <p:spPr>
           <a:xfrm>
-            <a:off x="1886971" y="4573422"/>
+            <a:off x="1787405" y="4174861"/>
             <a:ext cx="339941" cy="342968"/>
           </a:xfrm>
           <a:prstGeom prst="ellipse">
@@ -7549,7 +7811,7 @@
         </p:nvCxnSpPr>
         <p:spPr>
           <a:xfrm>
-            <a:off x="737980" y="3863424"/>
+            <a:off x="638414" y="3464863"/>
             <a:ext cx="692754" cy="221711"/>
           </a:xfrm>
           <a:prstGeom prst="line">
@@ -7582,7 +7844,7 @@
         </p:nvCxnSpPr>
         <p:spPr>
           <a:xfrm flipV="1">
-            <a:off x="1671109" y="3590102"/>
+            <a:off x="1571543" y="3191541"/>
             <a:ext cx="949954" cy="495033"/>
           </a:xfrm>
           <a:prstGeom prst="line">
@@ -7615,7 +7877,7 @@
         </p:nvCxnSpPr>
         <p:spPr>
           <a:xfrm flipH="1">
-            <a:off x="2177129" y="3711359"/>
+            <a:off x="2077563" y="3312798"/>
             <a:ext cx="493717" cy="912290"/>
           </a:xfrm>
           <a:prstGeom prst="line">
@@ -7648,7 +7910,7 @@
         </p:nvCxnSpPr>
         <p:spPr>
           <a:xfrm>
-            <a:off x="2056942" y="4916390"/>
+            <a:off x="1957376" y="4517829"/>
             <a:ext cx="169971" cy="650422"/>
           </a:xfrm>
           <a:prstGeom prst="line">
@@ -7681,7 +7943,7 @@
         </p:nvCxnSpPr>
         <p:spPr>
           <a:xfrm flipH="1" flipV="1">
-            <a:off x="568010" y="4034908"/>
+            <a:off x="468444" y="3636347"/>
             <a:ext cx="1488932" cy="1703388"/>
           </a:xfrm>
           <a:prstGeom prst="line">
@@ -7714,7 +7976,7 @@
         </p:nvCxnSpPr>
         <p:spPr>
           <a:xfrm>
-            <a:off x="1550922" y="4377876"/>
+            <a:off x="1451356" y="3979315"/>
             <a:ext cx="555803" cy="1239163"/>
           </a:xfrm>
           <a:prstGeom prst="line">
@@ -7747,7 +8009,7 @@
         </p:nvCxnSpPr>
         <p:spPr>
           <a:xfrm>
-            <a:off x="1671109" y="4327649"/>
+            <a:off x="1571543" y="3929088"/>
             <a:ext cx="265645" cy="296000"/>
           </a:xfrm>
           <a:prstGeom prst="line">
@@ -7780,7 +8042,7 @@
         </p:nvCxnSpPr>
         <p:spPr>
           <a:xfrm flipV="1">
-            <a:off x="688197" y="3468845"/>
+            <a:off x="588631" y="3070284"/>
             <a:ext cx="1982649" cy="273322"/>
           </a:xfrm>
           <a:prstGeom prst="line">
@@ -7813,7 +8075,7 @@
         </p:nvCxnSpPr>
         <p:spPr>
           <a:xfrm>
-            <a:off x="688197" y="3984681"/>
+            <a:off x="588631" y="3586120"/>
             <a:ext cx="1198774" cy="760225"/>
           </a:xfrm>
           <a:prstGeom prst="line">
@@ -7846,7 +8108,7 @@
         </p:nvCxnSpPr>
         <p:spPr>
           <a:xfrm flipH="1">
-            <a:off x="2347100" y="3761586"/>
+            <a:off x="2247534" y="3363025"/>
             <a:ext cx="443934" cy="1855453"/>
           </a:xfrm>
           <a:prstGeom prst="line">
@@ -7876,7 +8138,7 @@
         </p:nvSpPr>
         <p:spPr>
           <a:xfrm>
-            <a:off x="4382583" y="4090501"/>
+            <a:off x="4283017" y="3691940"/>
             <a:ext cx="339941" cy="342968"/>
           </a:xfrm>
           <a:prstGeom prst="ellipse">
@@ -7919,7 +8181,7 @@
         </p:nvSpPr>
         <p:spPr>
           <a:xfrm>
-            <a:off x="5622695" y="3474211"/>
+            <a:off x="5523129" y="3075650"/>
             <a:ext cx="339941" cy="342968"/>
           </a:xfrm>
           <a:prstGeom prst="ellipse">
@@ -7962,7 +8224,7 @@
         </p:nvSpPr>
         <p:spPr>
           <a:xfrm>
-            <a:off x="3399671" y="3747533"/>
+            <a:off x="3300105" y="3348972"/>
             <a:ext cx="339941" cy="342968"/>
           </a:xfrm>
           <a:prstGeom prst="ellipse">
@@ -8005,7 +8267,7 @@
         </p:nvSpPr>
         <p:spPr>
           <a:xfrm>
-            <a:off x="5058574" y="5622405"/>
+            <a:off x="4959008" y="5223844"/>
             <a:ext cx="339941" cy="342968"/>
           </a:xfrm>
           <a:prstGeom prst="ellipse">
@@ -8048,7 +8310,7 @@
         </p:nvSpPr>
         <p:spPr>
           <a:xfrm>
-            <a:off x="4888603" y="4629015"/>
+            <a:off x="4789037" y="4230454"/>
             <a:ext cx="339941" cy="342968"/>
           </a:xfrm>
           <a:prstGeom prst="ellipse">
@@ -8094,7 +8356,7 @@
         </p:nvCxnSpPr>
         <p:spPr>
           <a:xfrm flipH="1">
-            <a:off x="3739612" y="3645695"/>
+            <a:off x="3640046" y="3247134"/>
             <a:ext cx="1883083" cy="273322"/>
           </a:xfrm>
           <a:prstGeom prst="line">
@@ -8131,7 +8393,7 @@
         </p:nvCxnSpPr>
         <p:spPr>
           <a:xfrm flipH="1">
-            <a:off x="5348732" y="3817179"/>
+            <a:off x="5249166" y="3418618"/>
             <a:ext cx="443934" cy="1855453"/>
           </a:xfrm>
           <a:prstGeom prst="line">
@@ -8168,7 +8430,7 @@
         </p:nvCxnSpPr>
         <p:spPr>
           <a:xfrm>
-            <a:off x="4552554" y="4433469"/>
+            <a:off x="4452988" y="4034908"/>
             <a:ext cx="555803" cy="1239163"/>
           </a:xfrm>
           <a:prstGeom prst="line">
@@ -8205,7 +8467,7 @@
         </p:nvCxnSpPr>
         <p:spPr>
           <a:xfrm>
-            <a:off x="4672741" y="4383242"/>
+            <a:off x="4573175" y="3984681"/>
             <a:ext cx="265645" cy="296000"/>
           </a:xfrm>
           <a:prstGeom prst="line">
@@ -8239,7 +8501,7 @@
         </p:nvSpPr>
         <p:spPr>
           <a:xfrm>
-            <a:off x="7326334" y="4090501"/>
+            <a:off x="7226768" y="3691940"/>
             <a:ext cx="339941" cy="342968"/>
           </a:xfrm>
           <a:prstGeom prst="ellipse">
@@ -8282,7 +8544,7 @@
         </p:nvSpPr>
         <p:spPr>
           <a:xfrm>
-            <a:off x="8566446" y="3474211"/>
+            <a:off x="8466880" y="3075650"/>
             <a:ext cx="339941" cy="342968"/>
           </a:xfrm>
           <a:prstGeom prst="ellipse">
@@ -8325,7 +8587,7 @@
         </p:nvSpPr>
         <p:spPr>
           <a:xfrm>
-            <a:off x="6343422" y="3747533"/>
+            <a:off x="6243856" y="3348972"/>
             <a:ext cx="339941" cy="342968"/>
           </a:xfrm>
           <a:prstGeom prst="ellipse">
@@ -8368,7 +8630,7 @@
         </p:nvSpPr>
         <p:spPr>
           <a:xfrm>
-            <a:off x="8002325" y="5622405"/>
+            <a:off x="7902759" y="5223844"/>
             <a:ext cx="339941" cy="342968"/>
           </a:xfrm>
           <a:prstGeom prst="ellipse">
@@ -8411,7 +8673,7 @@
         </p:nvSpPr>
         <p:spPr>
           <a:xfrm>
-            <a:off x="7832354" y="4629015"/>
+            <a:off x="7732788" y="4230454"/>
             <a:ext cx="339941" cy="342968"/>
           </a:xfrm>
           <a:prstGeom prst="ellipse">
@@ -8457,7 +8719,7 @@
         </p:nvCxnSpPr>
         <p:spPr>
           <a:xfrm flipH="1">
-            <a:off x="6683363" y="3645695"/>
+            <a:off x="6583797" y="3247134"/>
             <a:ext cx="1883083" cy="273322"/>
           </a:xfrm>
           <a:prstGeom prst="line">
@@ -8494,7 +8756,7 @@
         </p:nvCxnSpPr>
         <p:spPr>
           <a:xfrm flipV="1">
-            <a:off x="8292483" y="3817179"/>
+            <a:off x="8192917" y="3418618"/>
             <a:ext cx="443934" cy="1855453"/>
           </a:xfrm>
           <a:prstGeom prst="line">
@@ -8530,6 +8792,88 @@
   <p:clrMapOvr>
     <a:masterClrMapping/>
   </p:clrMapOvr>
+  <p:timing>
+    <p:tnLst>
+      <p:par>
+        <p:cTn xmlns:p14="http://schemas.microsoft.com/office/powerpoint/2010/main" id="1" dur="indefinite" restart="never" nodeType="tmRoot">
+          <p:childTnLst>
+            <p:seq concurrent="1" nextAc="seek">
+              <p:cTn id="2" dur="indefinite" nodeType="mainSeq">
+                <p:childTnLst>
+                  <p:par>
+                    <p:cTn id="3" fill="hold">
+                      <p:stCondLst>
+                        <p:cond delay="indefinite"/>
+                      </p:stCondLst>
+                      <p:childTnLst>
+                        <p:par>
+                          <p:cTn id="4" fill="hold">
+                            <p:stCondLst>
+                              <p:cond delay="0"/>
+                            </p:stCondLst>
+                            <p:childTnLst>
+                              <p:par>
+                                <p:cTn id="5" presetID="1" presetClass="entr" presetSubtype="0" fill="hold" grpId="0" nodeType="clickEffect">
+                                  <p:stCondLst>
+                                    <p:cond delay="0"/>
+                                  </p:stCondLst>
+                                  <p:childTnLst>
+                                    <p:set>
+                                      <p:cBhvr>
+                                        <p:cTn id="6" dur="1" fill="hold">
+                                          <p:stCondLst>
+                                            <p:cond delay="0"/>
+                                          </p:stCondLst>
+                                        </p:cTn>
+                                        <p:tgtEl>
+                                          <p:spTgt spid="4">
+                                            <p:txEl>
+                                              <p:pRg st="6" end="6"/>
+                                            </p:txEl>
+                                          </p:spTgt>
+                                        </p:tgtEl>
+                                        <p:attrNameLst>
+                                          <p:attrName>style.visibility</p:attrName>
+                                        </p:attrNameLst>
+                                      </p:cBhvr>
+                                      <p:to>
+                                        <p:strVal val="visible"/>
+                                      </p:to>
+                                    </p:set>
+                                  </p:childTnLst>
+                                </p:cTn>
+                              </p:par>
+                            </p:childTnLst>
+                          </p:cTn>
+                        </p:par>
+                      </p:childTnLst>
+                    </p:cTn>
+                  </p:par>
+                </p:childTnLst>
+              </p:cTn>
+              <p:prevCondLst>
+                <p:cond evt="onPrev" delay="0">
+                  <p:tgtEl>
+                    <p:sldTgt/>
+                  </p:tgtEl>
+                </p:cond>
+              </p:prevCondLst>
+              <p:nextCondLst>
+                <p:cond evt="onNext" delay="0">
+                  <p:tgtEl>
+                    <p:sldTgt/>
+                  </p:tgtEl>
+                </p:cond>
+              </p:nextCondLst>
+            </p:seq>
+          </p:childTnLst>
+        </p:cTn>
+      </p:par>
+    </p:tnLst>
+    <p:bldLst>
+      <p:bldP spid="4" grpId="0" uiExpand="1" build="p"/>
+    </p:bldLst>
+  </p:timing>
 </p:sld>
 </file>
 
@@ -8593,15 +8937,7 @@
             </a:r>
             <a:r>
               <a:rPr lang="fr-FR"/>
-              <a:t> rel</a:t>
-            </a:r>
-            <a:r>
-              <a:rPr lang="fr-FR"/>
-              <a:t>â</a:t>
-            </a:r>
-            <a:r>
-              <a:rPr lang="fr-FR"/>
-              <a:t>che la section critique et envoie le jeton à </a:t>
+              <a:t> relâche la section critique et envoie le jeton à </a:t>
             </a:r>
             <a:r>
               <a:rPr lang="fr-FR" i="1"/>
@@ -9804,6 +10140,13 @@
   <p:clrMapOvr>
     <a:masterClrMapping/>
   </p:clrMapOvr>
+  <p:timing>
+    <p:tnLst>
+      <p:par>
+        <p:cTn xmlns:p14="http://schemas.microsoft.com/office/powerpoint/2010/main" id="1" dur="indefinite" restart="never" nodeType="tmRoot"/>
+      </p:par>
+    </p:tnLst>
+  </p:timing>
 </p:sld>
 </file>
 
@@ -9901,13 +10244,8 @@
             </a:pPr>
             <a:r>
               <a:rPr lang="fr-FR"/>
-              <a:t>un site qui envoie le jeton le perd pour lui-m</a:t>
-            </a:r>
-            <a:r>
-              <a:rPr lang="fr-FR"/>
-              <a:t>ême</a:t>
-            </a:r>
-            <a:endParaRPr lang="fr-FR"/>
+              <a:t>un site qui envoie le jeton le perd pour lui-même</a:t>
+            </a:r>
           </a:p>
         </p:txBody>
       </p:sp>
@@ -9945,6 +10283,13 @@
   <p:clrMapOvr>
     <a:masterClrMapping/>
   </p:clrMapOvr>
+  <p:timing>
+    <p:tnLst>
+      <p:par>
+        <p:cTn xmlns:p14="http://schemas.microsoft.com/office/powerpoint/2010/main" id="1" dur="indefinite" restart="never" nodeType="tmRoot"/>
+      </p:par>
+    </p:tnLst>
+  </p:timing>
 </p:sld>
 </file>
 
@@ -10293,6 +10638,13 @@
   <p:clrMapOvr>
     <a:masterClrMapping/>
   </p:clrMapOvr>
+  <p:timing>
+    <p:tnLst>
+      <p:par>
+        <p:cTn xmlns:p14="http://schemas.microsoft.com/office/powerpoint/2010/main" id="1" dur="indefinite" restart="never" nodeType="tmRoot"/>
+      </p:par>
+    </p:tnLst>
+  </p:timing>
 </p:sld>
 </file>
 
@@ -10369,6 +10721,13 @@
   <p:clrMapOvr>
     <a:masterClrMapping/>
   </p:clrMapOvr>
+  <p:timing>
+    <p:tnLst>
+      <p:par>
+        <p:cTn xmlns:p14="http://schemas.microsoft.com/office/powerpoint/2010/main" id="1" dur="indefinite" restart="never" nodeType="tmRoot"/>
+      </p:par>
+    </p:tnLst>
+  </p:timing>
 </p:sld>
 </file>
 
@@ -10511,6 +10870,13 @@
   <p:clrMapOvr>
     <a:masterClrMapping/>
   </p:clrMapOvr>
+  <p:timing>
+    <p:tnLst>
+      <p:par>
+        <p:cTn xmlns:p14="http://schemas.microsoft.com/office/powerpoint/2010/main" id="1" dur="indefinite" restart="never" nodeType="tmRoot"/>
+      </p:par>
+    </p:tnLst>
+  </p:timing>
 </p:sld>
 </file>
 
@@ -10647,6 +11013,13 @@
   <p:clrMapOvr>
     <a:masterClrMapping/>
   </p:clrMapOvr>
+  <p:timing>
+    <p:tnLst>
+      <p:par>
+        <p:cTn xmlns:p14="http://schemas.microsoft.com/office/powerpoint/2010/main" id="1" dur="indefinite" restart="never" nodeType="tmRoot"/>
+      </p:par>
+    </p:tnLst>
+  </p:timing>
 </p:sld>
 </file>
 
@@ -10844,7 +11217,6 @@
               <a:rPr lang="fr-FR" sz="2000"/>
               <a:t> [3]</a:t>
             </a:r>
-            <a:endParaRPr lang="fr-FR" sz="2000"/>
           </a:p>
         </p:txBody>
       </p:sp>
@@ -10883,7 +11255,6 @@
               <a:rPr lang="fr-FR"/>
               <a:t>Conservation de la position dans la file</a:t>
             </a:r>
-            <a:endParaRPr lang="fr-FR"/>
           </a:p>
           <a:p>
             <a:pPr>
@@ -10960,6 +11331,13 @@
   <p:clrMapOvr>
     <a:masterClrMapping/>
   </p:clrMapOvr>
+  <p:timing>
+    <p:tnLst>
+      <p:par>
+        <p:cTn xmlns:p14="http://schemas.microsoft.com/office/powerpoint/2010/main" id="1" dur="indefinite" restart="never" nodeType="tmRoot"/>
+      </p:par>
+    </p:tnLst>
+  </p:timing>
 </p:sld>
 </file>
 
@@ -11116,6 +11494,13 @@
   <p:clrMapOvr>
     <a:masterClrMapping/>
   </p:clrMapOvr>
+  <p:timing>
+    <p:tnLst>
+      <p:par>
+        <p:cTn xmlns:p14="http://schemas.microsoft.com/office/powerpoint/2010/main" id="1" dur="indefinite" restart="never" nodeType="tmRoot"/>
+      </p:par>
+    </p:tnLst>
+  </p:timing>
 </p:sld>
 </file>
 
@@ -11605,15 +11990,58 @@
             <p:ph idx="1"/>
           </p:nvPr>
         </p:nvSpPr>
-        <p:spPr/>
-        <p:txBody>
-          <a:bodyPr/>
+        <p:spPr>
+          <a:xfrm>
+            <a:off x="1435608" y="1447800"/>
+            <a:ext cx="7498080" cy="5129368"/>
+          </a:xfrm>
+        </p:spPr>
+        <p:txBody>
+          <a:bodyPr>
+            <a:normAutofit lnSpcReduction="10000"/>
+          </a:bodyPr>
           <a:lstStyle/>
           <a:p>
             <a:r>
               <a:rPr lang="fr-FR"/>
               <a:t>Situation initiale : deux sites en panne</a:t>
             </a:r>
+          </a:p>
+          <a:p>
+            <a:endParaRPr lang="fr-FR"/>
+          </a:p>
+          <a:p>
+            <a:endParaRPr lang="fr-FR"/>
+          </a:p>
+          <a:p>
+            <a:endParaRPr lang="fr-FR"/>
+          </a:p>
+          <a:p>
+            <a:endParaRPr lang="fr-FR"/>
+          </a:p>
+          <a:p>
+            <a:endParaRPr lang="fr-FR"/>
+          </a:p>
+          <a:p>
+            <a:r>
+              <a:rPr lang="fr-FR" i="1"/>
+              <a:t>a</a:t>
+            </a:r>
+            <a:r>
+              <a:rPr lang="fr-FR"/>
+              <a:t> et </a:t>
+            </a:r>
+            <a:r>
+              <a:rPr lang="fr-FR" i="1"/>
+              <a:t>d</a:t>
+            </a:r>
+            <a:r>
+              <a:rPr lang="fr-FR"/>
+              <a:t> détectent une panne simultanément</a:t>
+            </a:r>
+          </a:p>
+          <a:p>
+            <a:endParaRPr lang="fr-FR"/>
           </a:p>
         </p:txBody>
       </p:sp>
@@ -13214,6 +13642,85 @@
   <p:clrMapOvr>
     <a:masterClrMapping/>
   </p:clrMapOvr>
+  <p:timing>
+    <p:tnLst>
+      <p:par>
+        <p:cTn xmlns:p14="http://schemas.microsoft.com/office/powerpoint/2010/main" id="1" dur="indefinite" restart="never" nodeType="tmRoot">
+          <p:childTnLst>
+            <p:seq concurrent="1" nextAc="seek">
+              <p:cTn id="2" dur="indefinite" nodeType="mainSeq">
+                <p:childTnLst>
+                  <p:par>
+                    <p:cTn id="3" fill="hold">
+                      <p:stCondLst>
+                        <p:cond delay="indefinite"/>
+                      </p:stCondLst>
+                      <p:childTnLst>
+                        <p:par>
+                          <p:cTn id="4" fill="hold">
+                            <p:stCondLst>
+                              <p:cond delay="0"/>
+                            </p:stCondLst>
+                            <p:childTnLst>
+                              <p:par>
+                                <p:cTn id="5" presetID="1" presetClass="entr" presetSubtype="0" fill="hold" nodeType="clickEffect">
+                                  <p:stCondLst>
+                                    <p:cond delay="0"/>
+                                  </p:stCondLst>
+                                  <p:childTnLst>
+                                    <p:set>
+                                      <p:cBhvr>
+                                        <p:cTn id="6" dur="1" fill="hold">
+                                          <p:stCondLst>
+                                            <p:cond delay="0"/>
+                                          </p:stCondLst>
+                                        </p:cTn>
+                                        <p:tgtEl>
+                                          <p:spTgt spid="4">
+                                            <p:txEl>
+                                              <p:pRg st="6" end="6"/>
+                                            </p:txEl>
+                                          </p:spTgt>
+                                        </p:tgtEl>
+                                        <p:attrNameLst>
+                                          <p:attrName>style.visibility</p:attrName>
+                                        </p:attrNameLst>
+                                      </p:cBhvr>
+                                      <p:to>
+                                        <p:strVal val="visible"/>
+                                      </p:to>
+                                    </p:set>
+                                  </p:childTnLst>
+                                </p:cTn>
+                              </p:par>
+                            </p:childTnLst>
+                          </p:cTn>
+                        </p:par>
+                      </p:childTnLst>
+                    </p:cTn>
+                  </p:par>
+                </p:childTnLst>
+              </p:cTn>
+              <p:prevCondLst>
+                <p:cond evt="onPrev" delay="0">
+                  <p:tgtEl>
+                    <p:sldTgt/>
+                  </p:tgtEl>
+                </p:cond>
+              </p:prevCondLst>
+              <p:nextCondLst>
+                <p:cond evt="onNext" delay="0">
+                  <p:tgtEl>
+                    <p:sldTgt/>
+                  </p:tgtEl>
+                </p:cond>
+              </p:nextCondLst>
+            </p:seq>
+          </p:childTnLst>
+        </p:cTn>
+      </p:par>
+    </p:tnLst>
+  </p:timing>
 </p:sld>
 </file>
 
@@ -14407,6 +14914,13 @@
   <p:clrMapOvr>
     <a:masterClrMapping/>
   </p:clrMapOvr>
+  <p:timing>
+    <p:tnLst>
+      <p:par>
+        <p:cTn xmlns:p14="http://schemas.microsoft.com/office/powerpoint/2010/main" id="1" dur="indefinite" restart="never" nodeType="tmRoot"/>
+      </p:par>
+    </p:tnLst>
+  </p:timing>
 </p:sld>
 </file>
 
@@ -15931,11 +16445,7 @@
             <a:pPr lvl="1"/>
             <a:r>
               <a:rPr lang="fr-FR"/>
-              <a:t>renvoie des requ</a:t>
-            </a:r>
-            <a:r>
-              <a:rPr lang="fr-FR"/>
-              <a:t>êtes perdues</a:t>
+              <a:t>renvoie des requêtes perdues</a:t>
             </a:r>
           </a:p>
           <a:p>
@@ -15958,7 +16468,6 @@
               <a:rPr lang="fr-FR"/>
               <a:t> </a:t>
             </a:r>
-            <a:endParaRPr lang="fr-FR"/>
           </a:p>
         </p:txBody>
       </p:sp>
@@ -16155,6 +16664,13 @@
   <p:clrMapOvr>
     <a:masterClrMapping/>
   </p:clrMapOvr>
+  <p:timing>
+    <p:tnLst>
+      <p:par>
+        <p:cTn xmlns:p14="http://schemas.microsoft.com/office/powerpoint/2010/main" id="1" dur="indefinite" restart="never" nodeType="tmRoot"/>
+      </p:par>
+    </p:tnLst>
+  </p:timing>
 </p:sld>
 </file>
 
@@ -16274,6 +16790,13 @@
   <p:clrMapOvr>
     <a:masterClrMapping/>
   </p:clrMapOvr>
+  <p:timing>
+    <p:tnLst>
+      <p:par>
+        <p:cTn xmlns:p14="http://schemas.microsoft.com/office/powerpoint/2010/main" id="1" dur="indefinite" restart="never" nodeType="tmRoot"/>
+      </p:par>
+    </p:tnLst>
+  </p:timing>
 </p:sld>
 </file>
 
@@ -16328,7 +16851,9 @@
         </p:nvSpPr>
         <p:spPr/>
         <p:txBody>
-          <a:bodyPr/>
+          <a:bodyPr>
+            <a:normAutofit lnSpcReduction="10000"/>
+          </a:bodyPr>
           <a:lstStyle/>
           <a:p>
             <a:r>
@@ -16347,6 +16872,22 @@
             <a:r>
               <a:rPr lang="fr-FR"/>
               <a:t>Récupération du père dans l’arbre</a:t>
+            </a:r>
+          </a:p>
+          <a:p>
+            <a:pPr marL="402336" lvl="1" indent="0">
+              <a:buNone/>
+            </a:pPr>
+            <a:r>
+              <a:rPr lang="fr-FR"/>
+              <a:t>ou</a:t>
+            </a:r>
+          </a:p>
+          <a:p>
+            <a:pPr lvl="1"/>
+            <a:r>
+              <a:rPr lang="fr-FR"/>
+              <a:t>Élection</a:t>
             </a:r>
           </a:p>
           <a:p>
@@ -16398,6 +16939,13 @@
   <p:clrMapOvr>
     <a:masterClrMapping/>
   </p:clrMapOvr>
+  <p:timing>
+    <p:tnLst>
+      <p:par>
+        <p:cTn xmlns:p14="http://schemas.microsoft.com/office/powerpoint/2010/main" id="1" dur="indefinite" restart="never" nodeType="tmRoot"/>
+      </p:par>
+    </p:tnLst>
+  </p:timing>
 </p:sld>
 </file>
 
@@ -16435,7 +16983,7 @@
           <a:p>
             <a:r>
               <a:rPr lang="fr-FR"/>
-              <a:t>Problème rencontrés</a:t>
+              <a:t>Implémentation de Naimi-Trehel</a:t>
             </a:r>
           </a:p>
         </p:txBody>
@@ -16457,7 +17005,19 @@
           <a:p>
             <a:r>
               <a:rPr lang="fr-FR"/>
-              <a:t>Difficultés de debug sur une architecture distribuée</a:t>
+              <a:t>Mise en place de deux sockets</a:t>
+            </a:r>
+          </a:p>
+          <a:p>
+            <a:r>
+              <a:rPr lang="fr-FR"/>
+              <a:t>Attente non-bloquante</a:t>
+            </a:r>
+          </a:p>
+          <a:p>
+            <a:r>
+              <a:rPr lang="fr-FR"/>
+              <a:t>Gestion des mécanismes grâce aux protocoles réseau</a:t>
             </a:r>
           </a:p>
         </p:txBody>
@@ -16489,13 +17049,20 @@
     </p:spTree>
     <p:extLst>
       <p:ext uri="{BB962C8B-B14F-4D97-AF65-F5344CB8AC3E}">
-        <p14:creationId xmlns:p14="http://schemas.microsoft.com/office/powerpoint/2010/main" val="2760975924"/>
+        <p14:creationId xmlns:p14="http://schemas.microsoft.com/office/powerpoint/2010/main" val="3654971599"/>
       </p:ext>
     </p:extLst>
   </p:cSld>
   <p:clrMapOvr>
     <a:masterClrMapping/>
   </p:clrMapOvr>
+  <p:timing>
+    <p:tnLst>
+      <p:par>
+        <p:cTn xmlns:p14="http://schemas.microsoft.com/office/powerpoint/2010/main" id="1" dur="indefinite" restart="never" nodeType="tmRoot"/>
+      </p:par>
+    </p:tnLst>
+  </p:timing>
 </p:sld>
 </file>
 
@@ -16533,7 +17100,42 @@
           <a:p>
             <a:r>
               <a:rPr lang="fr-FR"/>
-              <a:t>Démonstration</a:t>
+              <a:t>Implémentation de l’extension</a:t>
+            </a:r>
+          </a:p>
+        </p:txBody>
+      </p:sp>
+      <p:sp>
+        <p:nvSpPr>
+          <p:cNvPr id="3" name="Espace réservé du contenu 2"/>
+          <p:cNvSpPr>
+            <a:spLocks noGrp="1"/>
+          </p:cNvSpPr>
+          <p:nvPr>
+            <p:ph idx="1"/>
+          </p:nvPr>
+        </p:nvSpPr>
+        <p:spPr/>
+        <p:txBody>
+          <a:bodyPr/>
+          <a:lstStyle/>
+          <a:p>
+            <a:r>
+              <a:rPr lang="fr-FR"/>
+              <a:t>thread : vérifie si le prédécesseur en vie</a:t>
+            </a:r>
+          </a:p>
+          <a:p>
+            <a:pPr lvl="1"/>
+            <a:r>
+              <a:rPr lang="fr-FR"/>
+              <a:t>signal pour la communication en cas de panne</a:t>
+            </a:r>
+          </a:p>
+          <a:p>
+            <a:r>
+              <a:rPr lang="fr-FR"/>
+              <a:t>Simulation de panne avec signaux</a:t>
             </a:r>
           </a:p>
         </p:txBody>
@@ -16565,13 +17167,20 @@
     </p:spTree>
     <p:extLst>
       <p:ext uri="{BB962C8B-B14F-4D97-AF65-F5344CB8AC3E}">
-        <p14:creationId xmlns:p14="http://schemas.microsoft.com/office/powerpoint/2010/main" val="962187010"/>
+        <p14:creationId xmlns:p14="http://schemas.microsoft.com/office/powerpoint/2010/main" val="2343840009"/>
       </p:ext>
     </p:extLst>
   </p:cSld>
   <p:clrMapOvr>
     <a:masterClrMapping/>
   </p:clrMapOvr>
+  <p:timing>
+    <p:tnLst>
+      <p:par>
+        <p:cTn xmlns:p14="http://schemas.microsoft.com/office/powerpoint/2010/main" id="1" dur="indefinite" restart="never" nodeType="tmRoot"/>
+      </p:par>
+    </p:tnLst>
+  </p:timing>
 </p:sld>
 </file>
 
@@ -16609,7 +17218,47 @@
           <a:p>
             <a:r>
               <a:rPr lang="fr-FR"/>
-              <a:t>Bibliographie</a:t>
+              <a:t>Problème concret : partition</a:t>
+            </a:r>
+          </a:p>
+        </p:txBody>
+      </p:sp>
+      <p:sp>
+        <p:nvSpPr>
+          <p:cNvPr id="3" name="Espace réservé du contenu 2"/>
+          <p:cNvSpPr>
+            <a:spLocks noGrp="1"/>
+          </p:cNvSpPr>
+          <p:nvPr>
+            <p:ph idx="1"/>
+          </p:nvPr>
+        </p:nvSpPr>
+        <p:spPr/>
+        <p:txBody>
+          <a:bodyPr/>
+          <a:lstStyle/>
+          <a:p>
+            <a:r>
+              <a:rPr lang="fr-FR"/>
+              <a:t>Ressource présente sur un site sup.</a:t>
+            </a:r>
+          </a:p>
+          <a:p>
+            <a:r>
+              <a:rPr lang="fr-FR"/>
+              <a:t>Thread de calcul dans chaque site</a:t>
+            </a:r>
+          </a:p>
+          <a:p>
+            <a:r>
+              <a:rPr lang="fr-FR"/>
+              <a:t>Demande de SC à la fin du calcul</a:t>
+            </a:r>
+          </a:p>
+          <a:p>
+            <a:r>
+              <a:rPr lang="fr-FR"/>
+              <a:t>Recherche de solution approchée</a:t>
             </a:r>
           </a:p>
         </p:txBody>
@@ -16641,13 +17290,20 @@
     </p:spTree>
     <p:extLst>
       <p:ext uri="{BB962C8B-B14F-4D97-AF65-F5344CB8AC3E}">
-        <p14:creationId xmlns:p14="http://schemas.microsoft.com/office/powerpoint/2010/main" val="4002767963"/>
+        <p14:creationId xmlns:p14="http://schemas.microsoft.com/office/powerpoint/2010/main" val="89000464"/>
       </p:ext>
     </p:extLst>
   </p:cSld>
   <p:clrMapOvr>
     <a:masterClrMapping/>
   </p:clrMapOvr>
+  <p:timing>
+    <p:tnLst>
+      <p:par>
+        <p:cTn xmlns:p14="http://schemas.microsoft.com/office/powerpoint/2010/main" id="1" dur="indefinite" restart="never" nodeType="tmRoot"/>
+      </p:par>
+    </p:tnLst>
+  </p:timing>
 </p:sld>
 </file>
 
@@ -16670,6 +17326,28 @@
       </p:grpSpPr>
       <p:sp>
         <p:nvSpPr>
+          <p:cNvPr id="2" name="Titre 1"/>
+          <p:cNvSpPr>
+            <a:spLocks noGrp="1"/>
+          </p:cNvSpPr>
+          <p:nvPr>
+            <p:ph type="title"/>
+          </p:nvPr>
+        </p:nvSpPr>
+        <p:spPr/>
+        <p:txBody>
+          <a:bodyPr/>
+          <a:lstStyle/>
+          <a:p>
+            <a:r>
+              <a:rPr lang="fr-FR"/>
+              <a:t>Problème rencontrés</a:t>
+            </a:r>
+          </a:p>
+        </p:txBody>
+      </p:sp>
+      <p:sp>
+        <p:nvSpPr>
           <p:cNvPr id="3" name="Espace réservé du contenu 2"/>
           <p:cNvSpPr>
             <a:spLocks noGrp="1"/>
@@ -16678,43 +17356,29 @@
             <p:ph idx="1"/>
           </p:nvPr>
         </p:nvSpPr>
-        <p:spPr>
-          <a:xfrm>
-            <a:off x="1435608" y="618645"/>
-            <a:ext cx="7498080" cy="5629755"/>
-          </a:xfrm>
-        </p:spPr>
+        <p:spPr/>
         <p:txBody>
           <a:bodyPr>
-            <a:normAutofit fontScale="70000" lnSpcReduction="20000"/>
+            <a:normAutofit/>
           </a:bodyPr>
           <a:lstStyle/>
           <a:p>
             <a:r>
               <a:rPr lang="fr-FR"/>
-              <a:t>[1]  M. Naimi, M. Trehel, and A. Arnold. A log (n) distributed mutual exclusion algorithm based on path reversal. Journal of Parallel and Distributed Computing, 34(1) :1–13, 1996. </a:t>
-            </a:r>
-            <a:endParaRPr lang="fr-FR">
-              <a:effectLst/>
-            </a:endParaRPr>
-          </a:p>
-          <a:p>
-            <a:r>
-              <a:rPr lang="fr-FR"/>
-              <a:t>[2]  Mohamed Naimi and Michel Trehel. How to detect a failure and regenerate the token in the log (n) distributed algorithm for mutual exclusion. Distributed Algorithms, pages 155–166, 1988. </a:t>
-            </a:r>
-            <a:endParaRPr lang="fr-FR">
-              <a:effectLst/>
-            </a:endParaRPr>
-          </a:p>
-          <a:p>
-            <a:r>
-              <a:rPr lang="fr-FR"/>
-              <a:t>[3]  J. Sopena, L. Arantes, M. Bertier, and P. Sens. A fault-tolerant token-based mutual exclusion algorithm using a dynamic tree. Euro-Par 2005 Parallel Processing, pages 644–644, 2005. </a:t>
-            </a:r>
-            <a:endParaRPr lang="fr-FR">
-              <a:effectLst/>
-            </a:endParaRPr>
+              <a:t>Mise en place de la phase d’élection avec pertes de messages</a:t>
+            </a:r>
+          </a:p>
+          <a:p>
+            <a:r>
+              <a:rPr lang="fr-FR"/>
+              <a:t>Difficultés de debug sur une architecture distribuée</a:t>
+            </a:r>
+          </a:p>
+          <a:p>
+            <a:r>
+              <a:rPr lang="fr-FR"/>
+              <a:t>Gestion de l’addressage mémoire sur le réseau</a:t>
+            </a:r>
           </a:p>
         </p:txBody>
       </p:sp>
@@ -16737,6 +17401,283 @@
               <a:rPr lang="en-US" smtClean="0"/>
               <a:pPr/>
               <a:t>35</a:t>
+            </a:fld>
+            <a:endParaRPr lang="en-US"/>
+          </a:p>
+        </p:txBody>
+      </p:sp>
+    </p:spTree>
+    <p:extLst>
+      <p:ext uri="{BB962C8B-B14F-4D97-AF65-F5344CB8AC3E}">
+        <p14:creationId xmlns:p14="http://schemas.microsoft.com/office/powerpoint/2010/main" val="2760975924"/>
+      </p:ext>
+    </p:extLst>
+  </p:cSld>
+  <p:clrMapOvr>
+    <a:masterClrMapping/>
+  </p:clrMapOvr>
+  <p:timing>
+    <p:tnLst>
+      <p:par>
+        <p:cTn xmlns:p14="http://schemas.microsoft.com/office/powerpoint/2010/main" id="1" dur="indefinite" restart="never" nodeType="tmRoot"/>
+      </p:par>
+    </p:tnLst>
+  </p:timing>
+</p:sld>
+</file>
+
+<file path=ppt/slides/slide37.xml><?xml version="1.0" encoding="utf-8"?>
+<p:sld xmlns:a="http://schemas.openxmlformats.org/drawingml/2006/main" xmlns:r="http://schemas.openxmlformats.org/officeDocument/2006/relationships" xmlns:p="http://schemas.openxmlformats.org/presentationml/2006/main">
+  <p:cSld>
+    <p:spTree>
+      <p:nvGrpSpPr>
+        <p:cNvPr id="1" name=""/>
+        <p:cNvGrpSpPr/>
+        <p:nvPr/>
+      </p:nvGrpSpPr>
+      <p:grpSpPr>
+        <a:xfrm>
+          <a:off x="0" y="0"/>
+          <a:ext cx="0" cy="0"/>
+          <a:chOff x="0" y="0"/>
+          <a:chExt cx="0" cy="0"/>
+        </a:xfrm>
+      </p:grpSpPr>
+      <p:sp>
+        <p:nvSpPr>
+          <p:cNvPr id="2" name="Titre 1"/>
+          <p:cNvSpPr>
+            <a:spLocks noGrp="1"/>
+          </p:cNvSpPr>
+          <p:nvPr>
+            <p:ph type="title"/>
+          </p:nvPr>
+        </p:nvSpPr>
+        <p:spPr/>
+        <p:txBody>
+          <a:bodyPr/>
+          <a:lstStyle/>
+          <a:p>
+            <a:r>
+              <a:rPr lang="fr-FR"/>
+              <a:t>Démonstration</a:t>
+            </a:r>
+          </a:p>
+        </p:txBody>
+      </p:sp>
+      <p:sp>
+        <p:nvSpPr>
+          <p:cNvPr id="4" name="Espace réservé du numéro de diapositive 3"/>
+          <p:cNvSpPr>
+            <a:spLocks noGrp="1"/>
+          </p:cNvSpPr>
+          <p:nvPr>
+            <p:ph type="sldNum" sz="quarter" idx="12"/>
+          </p:nvPr>
+        </p:nvSpPr>
+        <p:spPr/>
+        <p:txBody>
+          <a:bodyPr/>
+          <a:lstStyle/>
+          <a:p>
+            <a:fld id="{D7E63A33-8271-4DD0-9C48-789913D7C115}" type="slidenum">
+              <a:rPr lang="en-US" smtClean="0"/>
+              <a:pPr/>
+              <a:t>36</a:t>
+            </a:fld>
+            <a:endParaRPr lang="en-US"/>
+          </a:p>
+        </p:txBody>
+      </p:sp>
+    </p:spTree>
+    <p:extLst>
+      <p:ext uri="{BB962C8B-B14F-4D97-AF65-F5344CB8AC3E}">
+        <p14:creationId xmlns:p14="http://schemas.microsoft.com/office/powerpoint/2010/main" val="962187010"/>
+      </p:ext>
+    </p:extLst>
+  </p:cSld>
+  <p:clrMapOvr>
+    <a:masterClrMapping/>
+  </p:clrMapOvr>
+  <p:timing>
+    <p:tnLst>
+      <p:par>
+        <p:cTn xmlns:p14="http://schemas.microsoft.com/office/powerpoint/2010/main" id="1" dur="indefinite" restart="never" nodeType="tmRoot"/>
+      </p:par>
+    </p:tnLst>
+  </p:timing>
+</p:sld>
+</file>
+
+<file path=ppt/slides/slide38.xml><?xml version="1.0" encoding="utf-8"?>
+<p:sld xmlns:a="http://schemas.openxmlformats.org/drawingml/2006/main" xmlns:r="http://schemas.openxmlformats.org/officeDocument/2006/relationships" xmlns:p="http://schemas.openxmlformats.org/presentationml/2006/main">
+  <p:cSld>
+    <p:spTree>
+      <p:nvGrpSpPr>
+        <p:cNvPr id="1" name=""/>
+        <p:cNvGrpSpPr/>
+        <p:nvPr/>
+      </p:nvGrpSpPr>
+      <p:grpSpPr>
+        <a:xfrm>
+          <a:off x="0" y="0"/>
+          <a:ext cx="0" cy="0"/>
+          <a:chOff x="0" y="0"/>
+          <a:chExt cx="0" cy="0"/>
+        </a:xfrm>
+      </p:grpSpPr>
+      <p:sp>
+        <p:nvSpPr>
+          <p:cNvPr id="2" name="Titre 1"/>
+          <p:cNvSpPr>
+            <a:spLocks noGrp="1"/>
+          </p:cNvSpPr>
+          <p:nvPr>
+            <p:ph type="title"/>
+          </p:nvPr>
+        </p:nvSpPr>
+        <p:spPr/>
+        <p:txBody>
+          <a:bodyPr/>
+          <a:lstStyle/>
+          <a:p>
+            <a:r>
+              <a:rPr lang="fr-FR"/>
+              <a:t>Bibliographie</a:t>
+            </a:r>
+          </a:p>
+        </p:txBody>
+      </p:sp>
+      <p:sp>
+        <p:nvSpPr>
+          <p:cNvPr id="4" name="Espace réservé du numéro de diapositive 3"/>
+          <p:cNvSpPr>
+            <a:spLocks noGrp="1"/>
+          </p:cNvSpPr>
+          <p:nvPr>
+            <p:ph type="sldNum" sz="quarter" idx="12"/>
+          </p:nvPr>
+        </p:nvSpPr>
+        <p:spPr/>
+        <p:txBody>
+          <a:bodyPr/>
+          <a:lstStyle/>
+          <a:p>
+            <a:fld id="{D7E63A33-8271-4DD0-9C48-789913D7C115}" type="slidenum">
+              <a:rPr lang="en-US" smtClean="0"/>
+              <a:pPr/>
+              <a:t>37</a:t>
+            </a:fld>
+            <a:endParaRPr lang="en-US"/>
+          </a:p>
+        </p:txBody>
+      </p:sp>
+    </p:spTree>
+    <p:extLst>
+      <p:ext uri="{BB962C8B-B14F-4D97-AF65-F5344CB8AC3E}">
+        <p14:creationId xmlns:p14="http://schemas.microsoft.com/office/powerpoint/2010/main" val="4002767963"/>
+      </p:ext>
+    </p:extLst>
+  </p:cSld>
+  <p:clrMapOvr>
+    <a:masterClrMapping/>
+  </p:clrMapOvr>
+  <p:timing>
+    <p:tnLst>
+      <p:par>
+        <p:cTn xmlns:p14="http://schemas.microsoft.com/office/powerpoint/2010/main" id="1" dur="indefinite" restart="never" nodeType="tmRoot"/>
+      </p:par>
+    </p:tnLst>
+  </p:timing>
+</p:sld>
+</file>
+
+<file path=ppt/slides/slide39.xml><?xml version="1.0" encoding="utf-8"?>
+<p:sld xmlns:a="http://schemas.openxmlformats.org/drawingml/2006/main" xmlns:r="http://schemas.openxmlformats.org/officeDocument/2006/relationships" xmlns:p="http://schemas.openxmlformats.org/presentationml/2006/main">
+  <p:cSld>
+    <p:spTree>
+      <p:nvGrpSpPr>
+        <p:cNvPr id="1" name=""/>
+        <p:cNvGrpSpPr/>
+        <p:nvPr/>
+      </p:nvGrpSpPr>
+      <p:grpSpPr>
+        <a:xfrm>
+          <a:off x="0" y="0"/>
+          <a:ext cx="0" cy="0"/>
+          <a:chOff x="0" y="0"/>
+          <a:chExt cx="0" cy="0"/>
+        </a:xfrm>
+      </p:grpSpPr>
+      <p:sp>
+        <p:nvSpPr>
+          <p:cNvPr id="3" name="Espace réservé du contenu 2"/>
+          <p:cNvSpPr>
+            <a:spLocks noGrp="1"/>
+          </p:cNvSpPr>
+          <p:nvPr>
+            <p:ph idx="1"/>
+          </p:nvPr>
+        </p:nvSpPr>
+        <p:spPr>
+          <a:xfrm>
+            <a:off x="1435608" y="618645"/>
+            <a:ext cx="7498080" cy="5629755"/>
+          </a:xfrm>
+        </p:spPr>
+        <p:txBody>
+          <a:bodyPr>
+            <a:normAutofit fontScale="70000" lnSpcReduction="20000"/>
+          </a:bodyPr>
+          <a:lstStyle/>
+          <a:p>
+            <a:r>
+              <a:rPr lang="fr-FR"/>
+              <a:t>[1]  M. Naimi, M. Trehel, and A.  Arnold.  A log (n) distributed mutual exclusion algorithm based on path reversal. Journal of Parallel and Distributed Computing, 34(1) :1–13, 1996. </a:t>
+            </a:r>
+            <a:endParaRPr lang="fr-FR">
+              <a:effectLst/>
+            </a:endParaRPr>
+          </a:p>
+          <a:p>
+            <a:r>
+              <a:rPr lang="fr-FR"/>
+              <a:t>[2]  Mohamed Naimi and Michel Trehel. How to detect a failure and regenerate the token in the log (n) distributed algorithm for mutual exclusion. Distributed Algorithms, pages 155–166, 1988. </a:t>
+            </a:r>
+            <a:endParaRPr lang="fr-FR">
+              <a:effectLst/>
+            </a:endParaRPr>
+          </a:p>
+          <a:p>
+            <a:r>
+              <a:rPr lang="fr-FR"/>
+              <a:t>[3]  J. Sopena, L. Arantes, M. Bertier, and P. Sens. A fault-tolerant token-based mutual exclusion algorithm using a dynamic tree. Euro-Par 2005 Parallel Processing, pages 644–644, 2005. </a:t>
+            </a:r>
+            <a:endParaRPr lang="fr-FR">
+              <a:effectLst/>
+            </a:endParaRPr>
+          </a:p>
+        </p:txBody>
+      </p:sp>
+      <p:sp>
+        <p:nvSpPr>
+          <p:cNvPr id="4" name="Espace réservé du numéro de diapositive 3"/>
+          <p:cNvSpPr>
+            <a:spLocks noGrp="1"/>
+          </p:cNvSpPr>
+          <p:nvPr>
+            <p:ph type="sldNum" sz="quarter" idx="12"/>
+          </p:nvPr>
+        </p:nvSpPr>
+        <p:spPr/>
+        <p:txBody>
+          <a:bodyPr/>
+          <a:lstStyle/>
+          <a:p>
+            <a:fld id="{D7E63A33-8271-4DD0-9C48-789913D7C115}" type="slidenum">
+              <a:rPr lang="en-US" smtClean="0"/>
+              <a:pPr/>
+              <a:t>38</a:t>
             </a:fld>
             <a:endParaRPr lang="en-US"/>
           </a:p>
@@ -16752,6 +17693,13 @@
   <p:clrMapOvr>
     <a:masterClrMapping/>
   </p:clrMapOvr>
+  <p:timing>
+    <p:tnLst>
+      <p:par>
+        <p:cTn xmlns:p14="http://schemas.microsoft.com/office/powerpoint/2010/main" id="1" dur="indefinite" restart="never" nodeType="tmRoot"/>
+      </p:par>
+    </p:tnLst>
+  </p:timing>
 </p:sld>
 </file>
 
@@ -17806,7 +18754,6 @@
               <a:rPr lang="fr-FR"/>
               <a:t>Structures de données</a:t>
             </a:r>
-            <a:endParaRPr lang="fr-FR"/>
           </a:p>
         </p:txBody>
       </p:sp>
@@ -18189,15 +19136,15 @@
         <p:nvCxnSpPr>
           <p:cNvPr id="17" name="Connecteur droit 16"/>
           <p:cNvCxnSpPr>
-            <a:stCxn id="7" idx="4"/>
-            <a:endCxn id="10" idx="7"/>
+            <a:stCxn id="9" idx="6"/>
+            <a:endCxn id="10" idx="2"/>
           </p:cNvCxnSpPr>
           <p:nvPr/>
         </p:nvCxnSpPr>
         <p:spPr>
-          <a:xfrm flipH="1">
-            <a:off x="5929557" y="3882470"/>
-            <a:ext cx="183290" cy="910903"/>
+          <a:xfrm flipV="1">
+            <a:off x="4713517" y="4914630"/>
+            <a:ext cx="925882" cy="342968"/>
           </a:xfrm>
           <a:prstGeom prst="line">
             <a:avLst/>
@@ -18239,7 +19186,8 @@
             <a:avLst/>
           </a:prstGeom>
           <a:ln>
-            <a:tailEnd type="arrow"/>
+            <a:headEnd type="arrow"/>
+            <a:tailEnd type="none"/>
           </a:ln>
         </p:spPr>
         <p:style>
@@ -19324,6 +20272,13 @@
   <p:clrMapOvr>
     <a:masterClrMapping/>
   </p:clrMapOvr>
+  <p:timing>
+    <p:tnLst>
+      <p:par>
+        <p:cTn xmlns:p14="http://schemas.microsoft.com/office/powerpoint/2010/main" id="1" dur="indefinite" restart="never" nodeType="tmRoot"/>
+      </p:par>
+    </p:tnLst>
+  </p:timing>
 </p:sld>
 </file>
 
@@ -19376,9 +20331,16 @@
             <p:ph idx="1"/>
           </p:nvPr>
         </p:nvSpPr>
-        <p:spPr/>
-        <p:txBody>
-          <a:bodyPr/>
+        <p:spPr>
+          <a:xfrm>
+            <a:off x="1435608" y="1447800"/>
+            <a:ext cx="7498080" cy="5334000"/>
+          </a:xfrm>
+        </p:spPr>
+        <p:txBody>
+          <a:bodyPr>
+            <a:normAutofit/>
+          </a:bodyPr>
           <a:lstStyle/>
           <a:p>
             <a:r>
@@ -19393,6 +20355,34 @@
               <a:rPr lang="fr-FR"/>
               <a:t> possède le jeton</a:t>
             </a:r>
+          </a:p>
+          <a:p>
+            <a:endParaRPr lang="fr-FR"/>
+          </a:p>
+          <a:p>
+            <a:endParaRPr lang="fr-FR"/>
+          </a:p>
+          <a:p>
+            <a:endParaRPr lang="fr-FR"/>
+          </a:p>
+          <a:p>
+            <a:endParaRPr lang="fr-FR"/>
+          </a:p>
+          <a:p>
+            <a:endParaRPr lang="fr-FR"/>
+          </a:p>
+          <a:p>
+            <a:r>
+              <a:rPr lang="fr-FR" i="1"/>
+              <a:t>b</a:t>
+            </a:r>
+            <a:r>
+              <a:rPr lang="fr-FR"/>
+              <a:t> fait une demande de section critique</a:t>
+            </a:r>
+          </a:p>
+          <a:p>
+            <a:endParaRPr lang="fr-FR"/>
           </a:p>
         </p:txBody>
       </p:sp>
@@ -19428,7 +20418,7 @@
         </p:nvSpPr>
         <p:spPr>
           <a:xfrm>
-            <a:off x="1432023" y="4013456"/>
+            <a:off x="1262052" y="3683499"/>
             <a:ext cx="339941" cy="342968"/>
           </a:xfrm>
           <a:prstGeom prst="ellipse">
@@ -19471,7 +20461,7 @@
         </p:nvSpPr>
         <p:spPr>
           <a:xfrm>
-            <a:off x="2672135" y="3397166"/>
+            <a:off x="2502164" y="3067209"/>
             <a:ext cx="339941" cy="342968"/>
           </a:xfrm>
           <a:prstGeom prst="ellipse">
@@ -19514,7 +20504,7 @@
         </p:nvSpPr>
         <p:spPr>
           <a:xfrm>
-            <a:off x="451861" y="3654072"/>
+            <a:off x="281890" y="3324115"/>
             <a:ext cx="339941" cy="342968"/>
           </a:xfrm>
           <a:prstGeom prst="ellipse">
@@ -19557,7 +20547,7 @@
         </p:nvSpPr>
         <p:spPr>
           <a:xfrm>
-            <a:off x="2108014" y="5545360"/>
+            <a:off x="1938043" y="5215403"/>
             <a:ext cx="339941" cy="342968"/>
           </a:xfrm>
           <a:prstGeom prst="ellipse">
@@ -19600,7 +20590,7 @@
         </p:nvSpPr>
         <p:spPr>
           <a:xfrm>
-            <a:off x="1938043" y="4551970"/>
+            <a:off x="1768072" y="4222013"/>
             <a:ext cx="339941" cy="342968"/>
           </a:xfrm>
           <a:prstGeom prst="ellipse">
@@ -19645,7 +20635,7 @@
         </p:nvCxnSpPr>
         <p:spPr>
           <a:xfrm>
-            <a:off x="789052" y="3841972"/>
+            <a:off x="619081" y="3512015"/>
             <a:ext cx="692754" cy="221711"/>
           </a:xfrm>
           <a:prstGeom prst="line">
@@ -19678,7 +20668,7 @@
         </p:nvCxnSpPr>
         <p:spPr>
           <a:xfrm flipV="1">
-            <a:off x="1722181" y="3568650"/>
+            <a:off x="1552210" y="3238693"/>
             <a:ext cx="949954" cy="495033"/>
           </a:xfrm>
           <a:prstGeom prst="line">
@@ -19711,7 +20701,7 @@
         </p:nvCxnSpPr>
         <p:spPr>
           <a:xfrm flipH="1">
-            <a:off x="2228201" y="3689907"/>
+            <a:off x="2058230" y="3359950"/>
             <a:ext cx="493717" cy="912290"/>
           </a:xfrm>
           <a:prstGeom prst="line">
@@ -19744,7 +20734,7 @@
         </p:nvCxnSpPr>
         <p:spPr>
           <a:xfrm>
-            <a:off x="2108014" y="4894938"/>
+            <a:off x="1938043" y="4564981"/>
             <a:ext cx="169971" cy="650422"/>
           </a:xfrm>
           <a:prstGeom prst="line">
@@ -19776,7 +20766,7 @@
         </p:nvCxnSpPr>
         <p:spPr>
           <a:xfrm flipH="1" flipV="1">
-            <a:off x="619082" y="4013456"/>
+            <a:off x="449111" y="3683499"/>
             <a:ext cx="1488932" cy="1703388"/>
           </a:xfrm>
           <a:prstGeom prst="line">
@@ -19809,7 +20799,7 @@
         </p:nvCxnSpPr>
         <p:spPr>
           <a:xfrm>
-            <a:off x="1601994" y="4356424"/>
+            <a:off x="1432023" y="4026467"/>
             <a:ext cx="555803" cy="1239163"/>
           </a:xfrm>
           <a:prstGeom prst="line">
@@ -19842,7 +20832,7 @@
         </p:nvCxnSpPr>
         <p:spPr>
           <a:xfrm>
-            <a:off x="1722181" y="4306197"/>
+            <a:off x="1552210" y="3976240"/>
             <a:ext cx="265645" cy="296000"/>
           </a:xfrm>
           <a:prstGeom prst="line">
@@ -19874,7 +20864,7 @@
         </p:nvCxnSpPr>
         <p:spPr>
           <a:xfrm flipV="1">
-            <a:off x="739269" y="3447393"/>
+            <a:off x="569298" y="3117436"/>
             <a:ext cx="1982649" cy="273322"/>
           </a:xfrm>
           <a:prstGeom prst="line">
@@ -19906,7 +20896,7 @@
         </p:nvCxnSpPr>
         <p:spPr>
           <a:xfrm>
-            <a:off x="739269" y="3963229"/>
+            <a:off x="569298" y="3633272"/>
             <a:ext cx="1198774" cy="760225"/>
           </a:xfrm>
           <a:prstGeom prst="line">
@@ -19939,7 +20929,7 @@
         </p:nvCxnSpPr>
         <p:spPr>
           <a:xfrm flipH="1">
-            <a:off x="2398172" y="3740134"/>
+            <a:off x="2228201" y="3410177"/>
             <a:ext cx="443934" cy="1855453"/>
           </a:xfrm>
           <a:prstGeom prst="line">
@@ -19969,7 +20959,7 @@
         </p:nvSpPr>
         <p:spPr>
           <a:xfrm>
-            <a:off x="4433655" y="4069049"/>
+            <a:off x="4263684" y="3739092"/>
             <a:ext cx="339941" cy="342968"/>
           </a:xfrm>
           <a:prstGeom prst="ellipse">
@@ -20012,7 +21002,7 @@
         </p:nvSpPr>
         <p:spPr>
           <a:xfrm>
-            <a:off x="5673767" y="3452759"/>
+            <a:off x="5503796" y="3122802"/>
             <a:ext cx="339941" cy="342968"/>
           </a:xfrm>
           <a:prstGeom prst="ellipse">
@@ -20055,7 +21045,7 @@
         </p:nvSpPr>
         <p:spPr>
           <a:xfrm>
-            <a:off x="3450743" y="3726081"/>
+            <a:off x="3280772" y="3396124"/>
             <a:ext cx="339941" cy="342968"/>
           </a:xfrm>
           <a:prstGeom prst="ellipse">
@@ -20098,7 +21088,7 @@
         </p:nvSpPr>
         <p:spPr>
           <a:xfrm>
-            <a:off x="5109646" y="5600953"/>
+            <a:off x="4939675" y="5270996"/>
             <a:ext cx="339941" cy="342968"/>
           </a:xfrm>
           <a:prstGeom prst="ellipse">
@@ -20141,7 +21131,7 @@
         </p:nvSpPr>
         <p:spPr>
           <a:xfrm>
-            <a:off x="4939675" y="4607563"/>
+            <a:off x="4769704" y="4277606"/>
             <a:ext cx="339941" cy="342968"/>
           </a:xfrm>
           <a:prstGeom prst="ellipse">
@@ -20187,7 +21177,7 @@
         </p:nvCxnSpPr>
         <p:spPr>
           <a:xfrm>
-            <a:off x="3790684" y="3897565"/>
+            <a:off x="3620713" y="3567608"/>
             <a:ext cx="692754" cy="221711"/>
           </a:xfrm>
           <a:prstGeom prst="line">
@@ -20224,7 +21214,7 @@
         </p:nvCxnSpPr>
         <p:spPr>
           <a:xfrm flipV="1">
-            <a:off x="4723813" y="3624243"/>
+            <a:off x="4553842" y="3294286"/>
             <a:ext cx="949954" cy="495033"/>
           </a:xfrm>
           <a:prstGeom prst="line">
@@ -20261,7 +21251,7 @@
         </p:nvCxnSpPr>
         <p:spPr>
           <a:xfrm>
-            <a:off x="4603626" y="4412017"/>
+            <a:off x="4433655" y="4082060"/>
             <a:ext cx="555803" cy="1239163"/>
           </a:xfrm>
           <a:prstGeom prst="line">
@@ -20298,7 +21288,7 @@
         </p:nvCxnSpPr>
         <p:spPr>
           <a:xfrm>
-            <a:off x="4723813" y="4361790"/>
+            <a:off x="4553842" y="4031833"/>
             <a:ext cx="265645" cy="296000"/>
           </a:xfrm>
           <a:prstGeom prst="line">
@@ -20332,7 +21322,7 @@
         </p:nvSpPr>
         <p:spPr>
           <a:xfrm>
-            <a:off x="7377406" y="4069049"/>
+            <a:off x="7207435" y="3739092"/>
             <a:ext cx="339941" cy="342968"/>
           </a:xfrm>
           <a:prstGeom prst="ellipse">
@@ -20375,7 +21365,7 @@
         </p:nvSpPr>
         <p:spPr>
           <a:xfrm>
-            <a:off x="8617518" y="3452759"/>
+            <a:off x="8447547" y="3122802"/>
             <a:ext cx="339941" cy="342968"/>
           </a:xfrm>
           <a:prstGeom prst="ellipse">
@@ -20418,7 +21408,7 @@
         </p:nvSpPr>
         <p:spPr>
           <a:xfrm>
-            <a:off x="6394494" y="3726081"/>
+            <a:off x="6224523" y="3396124"/>
             <a:ext cx="339941" cy="342968"/>
           </a:xfrm>
           <a:prstGeom prst="ellipse">
@@ -20461,7 +21451,7 @@
         </p:nvSpPr>
         <p:spPr>
           <a:xfrm>
-            <a:off x="8053397" y="5600953"/>
+            <a:off x="7883426" y="5270996"/>
             <a:ext cx="339941" cy="342968"/>
           </a:xfrm>
           <a:prstGeom prst="ellipse">
@@ -20504,7 +21494,7 @@
         </p:nvSpPr>
         <p:spPr>
           <a:xfrm>
-            <a:off x="7883426" y="4607563"/>
+            <a:off x="7713455" y="4277606"/>
             <a:ext cx="339941" cy="342968"/>
           </a:xfrm>
           <a:prstGeom prst="ellipse">
@@ -20549,6 +21539,88 @@
   <p:clrMapOvr>
     <a:masterClrMapping/>
   </p:clrMapOvr>
+  <p:timing>
+    <p:tnLst>
+      <p:par>
+        <p:cTn xmlns:p14="http://schemas.microsoft.com/office/powerpoint/2010/main" id="1" dur="indefinite" restart="never" nodeType="tmRoot">
+          <p:childTnLst>
+            <p:seq concurrent="1" nextAc="seek">
+              <p:cTn id="2" dur="indefinite" nodeType="mainSeq">
+                <p:childTnLst>
+                  <p:par>
+                    <p:cTn id="3" fill="hold">
+                      <p:stCondLst>
+                        <p:cond delay="indefinite"/>
+                      </p:stCondLst>
+                      <p:childTnLst>
+                        <p:par>
+                          <p:cTn id="4" fill="hold">
+                            <p:stCondLst>
+                              <p:cond delay="0"/>
+                            </p:stCondLst>
+                            <p:childTnLst>
+                              <p:par>
+                                <p:cTn id="5" presetID="1" presetClass="entr" presetSubtype="0" fill="hold" grpId="0" nodeType="clickEffect">
+                                  <p:stCondLst>
+                                    <p:cond delay="0"/>
+                                  </p:stCondLst>
+                                  <p:childTnLst>
+                                    <p:set>
+                                      <p:cBhvr>
+                                        <p:cTn id="6" dur="1" fill="hold">
+                                          <p:stCondLst>
+                                            <p:cond delay="0"/>
+                                          </p:stCondLst>
+                                        </p:cTn>
+                                        <p:tgtEl>
+                                          <p:spTgt spid="4">
+                                            <p:txEl>
+                                              <p:pRg st="6" end="6"/>
+                                            </p:txEl>
+                                          </p:spTgt>
+                                        </p:tgtEl>
+                                        <p:attrNameLst>
+                                          <p:attrName>style.visibility</p:attrName>
+                                        </p:attrNameLst>
+                                      </p:cBhvr>
+                                      <p:to>
+                                        <p:strVal val="visible"/>
+                                      </p:to>
+                                    </p:set>
+                                  </p:childTnLst>
+                                </p:cTn>
+                              </p:par>
+                            </p:childTnLst>
+                          </p:cTn>
+                        </p:par>
+                      </p:childTnLst>
+                    </p:cTn>
+                  </p:par>
+                </p:childTnLst>
+              </p:cTn>
+              <p:prevCondLst>
+                <p:cond evt="onPrev" delay="0">
+                  <p:tgtEl>
+                    <p:sldTgt/>
+                  </p:tgtEl>
+                </p:cond>
+              </p:prevCondLst>
+              <p:nextCondLst>
+                <p:cond evt="onNext" delay="0">
+                  <p:tgtEl>
+                    <p:sldTgt/>
+                  </p:tgtEl>
+                </p:cond>
+              </p:nextCondLst>
+            </p:seq>
+          </p:childTnLst>
+        </p:cTn>
+      </p:par>
+    </p:tnLst>
+    <p:bldLst>
+      <p:bldP spid="4" grpId="0" uiExpand="1" build="p"/>
+    </p:bldLst>
+  </p:timing>
 </p:sld>
 </file>
 

</xml_diff>